<commit_message>
Added Todo work in layout and today's devlog
</commit_message>
<xml_diff>
--- a/layout.pptx
+++ b/layout.pptx
@@ -269,7 +269,7 @@
           <a:p>
             <a:fld id="{3916EF0B-21FF-479F-8051-9F9DC1DC802A}" type="datetimeFigureOut">
               <a:rPr lang="ko-KR" altLang="en-US" smtClean="0"/>
-              <a:t>2019-06-05</a:t>
+              <a:t>2019-06-08</a:t>
             </a:fld>
             <a:endParaRPr lang="ko-KR" altLang="en-US"/>
           </a:p>
@@ -469,7 +469,7 @@
           <a:p>
             <a:fld id="{3916EF0B-21FF-479F-8051-9F9DC1DC802A}" type="datetimeFigureOut">
               <a:rPr lang="ko-KR" altLang="en-US" smtClean="0"/>
-              <a:t>2019-06-05</a:t>
+              <a:t>2019-06-08</a:t>
             </a:fld>
             <a:endParaRPr lang="ko-KR" altLang="en-US"/>
           </a:p>
@@ -679,7 +679,7 @@
           <a:p>
             <a:fld id="{3916EF0B-21FF-479F-8051-9F9DC1DC802A}" type="datetimeFigureOut">
               <a:rPr lang="ko-KR" altLang="en-US" smtClean="0"/>
-              <a:t>2019-06-05</a:t>
+              <a:t>2019-06-08</a:t>
             </a:fld>
             <a:endParaRPr lang="ko-KR" altLang="en-US"/>
           </a:p>
@@ -879,7 +879,7 @@
           <a:p>
             <a:fld id="{3916EF0B-21FF-479F-8051-9F9DC1DC802A}" type="datetimeFigureOut">
               <a:rPr lang="ko-KR" altLang="en-US" smtClean="0"/>
-              <a:t>2019-06-05</a:t>
+              <a:t>2019-06-08</a:t>
             </a:fld>
             <a:endParaRPr lang="ko-KR" altLang="en-US"/>
           </a:p>
@@ -1155,7 +1155,7 @@
           <a:p>
             <a:fld id="{3916EF0B-21FF-479F-8051-9F9DC1DC802A}" type="datetimeFigureOut">
               <a:rPr lang="ko-KR" altLang="en-US" smtClean="0"/>
-              <a:t>2019-06-05</a:t>
+              <a:t>2019-06-08</a:t>
             </a:fld>
             <a:endParaRPr lang="ko-KR" altLang="en-US"/>
           </a:p>
@@ -1423,7 +1423,7 @@
           <a:p>
             <a:fld id="{3916EF0B-21FF-479F-8051-9F9DC1DC802A}" type="datetimeFigureOut">
               <a:rPr lang="ko-KR" altLang="en-US" smtClean="0"/>
-              <a:t>2019-06-05</a:t>
+              <a:t>2019-06-08</a:t>
             </a:fld>
             <a:endParaRPr lang="ko-KR" altLang="en-US"/>
           </a:p>
@@ -1838,7 +1838,7 @@
           <a:p>
             <a:fld id="{3916EF0B-21FF-479F-8051-9F9DC1DC802A}" type="datetimeFigureOut">
               <a:rPr lang="ko-KR" altLang="en-US" smtClean="0"/>
-              <a:t>2019-06-05</a:t>
+              <a:t>2019-06-08</a:t>
             </a:fld>
             <a:endParaRPr lang="ko-KR" altLang="en-US"/>
           </a:p>
@@ -1980,7 +1980,7 @@
           <a:p>
             <a:fld id="{3916EF0B-21FF-479F-8051-9F9DC1DC802A}" type="datetimeFigureOut">
               <a:rPr lang="ko-KR" altLang="en-US" smtClean="0"/>
-              <a:t>2019-06-05</a:t>
+              <a:t>2019-06-08</a:t>
             </a:fld>
             <a:endParaRPr lang="ko-KR" altLang="en-US"/>
           </a:p>
@@ -2093,7 +2093,7 @@
           <a:p>
             <a:fld id="{3916EF0B-21FF-479F-8051-9F9DC1DC802A}" type="datetimeFigureOut">
               <a:rPr lang="ko-KR" altLang="en-US" smtClean="0"/>
-              <a:t>2019-06-05</a:t>
+              <a:t>2019-06-08</a:t>
             </a:fld>
             <a:endParaRPr lang="ko-KR" altLang="en-US"/>
           </a:p>
@@ -2406,7 +2406,7 @@
           <a:p>
             <a:fld id="{3916EF0B-21FF-479F-8051-9F9DC1DC802A}" type="datetimeFigureOut">
               <a:rPr lang="ko-KR" altLang="en-US" smtClean="0"/>
-              <a:t>2019-06-05</a:t>
+              <a:t>2019-06-08</a:t>
             </a:fld>
             <a:endParaRPr lang="ko-KR" altLang="en-US"/>
           </a:p>
@@ -2695,7 +2695,7 @@
           <a:p>
             <a:fld id="{3916EF0B-21FF-479F-8051-9F9DC1DC802A}" type="datetimeFigureOut">
               <a:rPr lang="ko-KR" altLang="en-US" smtClean="0"/>
-              <a:t>2019-06-05</a:t>
+              <a:t>2019-06-08</a:t>
             </a:fld>
             <a:endParaRPr lang="ko-KR" altLang="en-US"/>
           </a:p>
@@ -2938,7 +2938,7 @@
           <a:p>
             <a:fld id="{3916EF0B-21FF-479F-8051-9F9DC1DC802A}" type="datetimeFigureOut">
               <a:rPr lang="ko-KR" altLang="en-US" smtClean="0"/>
-              <a:t>2019-06-05</a:t>
+              <a:t>2019-06-08</a:t>
             </a:fld>
             <a:endParaRPr lang="ko-KR" altLang="en-US"/>
           </a:p>
@@ -3525,12 +3525,24 @@
           </a:p>
           <a:p>
             <a:r>
-              <a:rPr lang="en-US" altLang="ko-KR" dirty="0" err="1"/>
-              <a:t>Analysing</a:t>
-            </a:r>
-            <a:r>
               <a:rPr lang="en-US" altLang="ko-KR" dirty="0"/>
-              <a:t> Hugo’s md syntax</a:t>
+              <a:t>Features</a:t>
+            </a:r>
+            <a:r>
+              <a:rPr lang="ko-KR" altLang="en-US" dirty="0"/>
+              <a:t> </a:t>
+            </a:r>
+            <a:r>
+              <a:rPr lang="en-US" altLang="ko-KR" dirty="0"/>
+              <a:t>to</a:t>
+            </a:r>
+            <a:r>
+              <a:rPr lang="ko-KR" altLang="en-US" dirty="0"/>
+              <a:t> </a:t>
+            </a:r>
+            <a:r>
+              <a:rPr lang="en-US" altLang="ko-KR" dirty="0"/>
+              <a:t>implement</a:t>
             </a:r>
           </a:p>
         </p:txBody>
@@ -4338,7 +4350,7 @@
           <a:p>
             <a:r>
               <a:rPr lang="en-US" altLang="ko-KR" dirty="0"/>
-              <a:t>Generator – Writes output made with tokens(.md) which can be processed with Hugo</a:t>
+              <a:t>Generator – Writes output made with tokens(.md) which can be processed with SSG</a:t>
             </a:r>
           </a:p>
           <a:p>
@@ -4541,7 +4553,9 @@
         </p:nvSpPr>
         <p:spPr/>
         <p:txBody>
-          <a:bodyPr/>
+          <a:bodyPr>
+            <a:normAutofit lnSpcReduction="10000"/>
+          </a:bodyPr>
           <a:lstStyle/>
           <a:p>
             <a:r>
@@ -4579,14 +4593,35 @@
           </a:p>
           <a:p>
             <a:r>
-              <a:rPr lang="en-US" altLang="ko-KR" dirty="0" err="1"/>
-              <a:t>Analyse</a:t>
-            </a:r>
-            <a:r>
               <a:rPr lang="en-US" altLang="ko-KR" dirty="0"/>
-              <a:t> Hugo’s md syntax</a:t>
-            </a:r>
-            <a:endParaRPr lang="ko-KR" altLang="en-US" dirty="0"/>
+              <a:t>Set features to implement</a:t>
+            </a:r>
+          </a:p>
+          <a:p>
+            <a:endParaRPr lang="en-US" altLang="ko-KR" dirty="0"/>
+          </a:p>
+          <a:p>
+            <a:r>
+              <a:rPr lang="en-US" altLang="ko-KR" dirty="0"/>
+              <a:t>Research about Travis</a:t>
+            </a:r>
+          </a:p>
+          <a:p>
+            <a:endParaRPr lang="en-US" altLang="ko-KR" dirty="0"/>
+          </a:p>
+          <a:p>
+            <a:r>
+              <a:rPr lang="en-US" altLang="ko-KR" dirty="0"/>
+              <a:t>Design </a:t>
+            </a:r>
+            <a:r>
+              <a:rPr lang="en-US" altLang="ko-KR"/>
+              <a:t>and confirm </a:t>
+            </a:r>
+            <a:r>
+              <a:rPr lang="en-US" altLang="ko-KR" dirty="0"/>
+              <a:t>build process</a:t>
+            </a:r>
           </a:p>
         </p:txBody>
       </p:sp>
@@ -4642,12 +4677,8 @@
           <a:lstStyle/>
           <a:p>
             <a:r>
-              <a:rPr lang="en-US" altLang="ko-KR" dirty="0" err="1"/>
-              <a:t>Analysing</a:t>
-            </a:r>
-            <a:r>
               <a:rPr lang="en-US" altLang="ko-KR" dirty="0"/>
-              <a:t> Hugo’s md syntax</a:t>
+              <a:t>Features to implement</a:t>
             </a:r>
             <a:endParaRPr lang="ko-KR" altLang="en-US" dirty="0"/>
           </a:p>
@@ -4674,7 +4705,20 @@
           <a:bodyPr/>
           <a:lstStyle/>
           <a:p>
-            <a:endParaRPr lang="ko-KR" altLang="en-US"/>
+            <a:r>
+              <a:rPr lang="en-US" altLang="ko-KR" dirty="0"/>
+              <a:t>Get external code snippet file from directory and display the content(use built-in syntax highlighting) with </a:t>
+            </a:r>
+            <a:r>
+              <a:rPr lang="en-US" altLang="ko-KR"/>
+              <a:t>execute result</a:t>
+            </a:r>
+          </a:p>
+          <a:p>
+            <a:endParaRPr lang="en-US" altLang="ko-KR"/>
+          </a:p>
+          <a:p>
+            <a:endParaRPr lang="en-US" altLang="ko-KR" dirty="0"/>
           </a:p>
         </p:txBody>
       </p:sp>

</xml_diff>

<commit_message>
Added some elements to design
</commit_message>
<xml_diff>
--- a/layout.pptx
+++ b/layout.pptx
@@ -10,10 +10,12 @@
     <p:sldId id="258" r:id="rId4"/>
     <p:sldId id="259" r:id="rId5"/>
     <p:sldId id="260" r:id="rId6"/>
-    <p:sldId id="262" r:id="rId7"/>
-    <p:sldId id="263" r:id="rId8"/>
-    <p:sldId id="264" r:id="rId9"/>
-    <p:sldId id="261" r:id="rId10"/>
+    <p:sldId id="263" r:id="rId7"/>
+    <p:sldId id="264" r:id="rId8"/>
+    <p:sldId id="261" r:id="rId9"/>
+    <p:sldId id="265" r:id="rId10"/>
+    <p:sldId id="262" r:id="rId11"/>
+    <p:sldId id="266" r:id="rId12"/>
   </p:sldIdLst>
   <p:sldSz cx="12192000" cy="6858000"/>
   <p:notesSz cx="6858000" cy="9144000"/>
@@ -269,7 +271,7 @@
           <a:p>
             <a:fld id="{3916EF0B-21FF-479F-8051-9F9DC1DC802A}" type="datetimeFigureOut">
               <a:rPr lang="ko-KR" altLang="en-US" smtClean="0"/>
-              <a:t>2019-06-08</a:t>
+              <a:t>2019-06-19</a:t>
             </a:fld>
             <a:endParaRPr lang="ko-KR" altLang="en-US"/>
           </a:p>
@@ -469,7 +471,7 @@
           <a:p>
             <a:fld id="{3916EF0B-21FF-479F-8051-9F9DC1DC802A}" type="datetimeFigureOut">
               <a:rPr lang="ko-KR" altLang="en-US" smtClean="0"/>
-              <a:t>2019-06-08</a:t>
+              <a:t>2019-06-19</a:t>
             </a:fld>
             <a:endParaRPr lang="ko-KR" altLang="en-US"/>
           </a:p>
@@ -679,7 +681,7 @@
           <a:p>
             <a:fld id="{3916EF0B-21FF-479F-8051-9F9DC1DC802A}" type="datetimeFigureOut">
               <a:rPr lang="ko-KR" altLang="en-US" smtClean="0"/>
-              <a:t>2019-06-08</a:t>
+              <a:t>2019-06-19</a:t>
             </a:fld>
             <a:endParaRPr lang="ko-KR" altLang="en-US"/>
           </a:p>
@@ -879,7 +881,7 @@
           <a:p>
             <a:fld id="{3916EF0B-21FF-479F-8051-9F9DC1DC802A}" type="datetimeFigureOut">
               <a:rPr lang="ko-KR" altLang="en-US" smtClean="0"/>
-              <a:t>2019-06-08</a:t>
+              <a:t>2019-06-19</a:t>
             </a:fld>
             <a:endParaRPr lang="ko-KR" altLang="en-US"/>
           </a:p>
@@ -1155,7 +1157,7 @@
           <a:p>
             <a:fld id="{3916EF0B-21FF-479F-8051-9F9DC1DC802A}" type="datetimeFigureOut">
               <a:rPr lang="ko-KR" altLang="en-US" smtClean="0"/>
-              <a:t>2019-06-08</a:t>
+              <a:t>2019-06-19</a:t>
             </a:fld>
             <a:endParaRPr lang="ko-KR" altLang="en-US"/>
           </a:p>
@@ -1423,7 +1425,7 @@
           <a:p>
             <a:fld id="{3916EF0B-21FF-479F-8051-9F9DC1DC802A}" type="datetimeFigureOut">
               <a:rPr lang="ko-KR" altLang="en-US" smtClean="0"/>
-              <a:t>2019-06-08</a:t>
+              <a:t>2019-06-19</a:t>
             </a:fld>
             <a:endParaRPr lang="ko-KR" altLang="en-US"/>
           </a:p>
@@ -1838,7 +1840,7 @@
           <a:p>
             <a:fld id="{3916EF0B-21FF-479F-8051-9F9DC1DC802A}" type="datetimeFigureOut">
               <a:rPr lang="ko-KR" altLang="en-US" smtClean="0"/>
-              <a:t>2019-06-08</a:t>
+              <a:t>2019-06-19</a:t>
             </a:fld>
             <a:endParaRPr lang="ko-KR" altLang="en-US"/>
           </a:p>
@@ -1980,7 +1982,7 @@
           <a:p>
             <a:fld id="{3916EF0B-21FF-479F-8051-9F9DC1DC802A}" type="datetimeFigureOut">
               <a:rPr lang="ko-KR" altLang="en-US" smtClean="0"/>
-              <a:t>2019-06-08</a:t>
+              <a:t>2019-06-19</a:t>
             </a:fld>
             <a:endParaRPr lang="ko-KR" altLang="en-US"/>
           </a:p>
@@ -2093,7 +2095,7 @@
           <a:p>
             <a:fld id="{3916EF0B-21FF-479F-8051-9F9DC1DC802A}" type="datetimeFigureOut">
               <a:rPr lang="ko-KR" altLang="en-US" smtClean="0"/>
-              <a:t>2019-06-08</a:t>
+              <a:t>2019-06-19</a:t>
             </a:fld>
             <a:endParaRPr lang="ko-KR" altLang="en-US"/>
           </a:p>
@@ -2406,7 +2408,7 @@
           <a:p>
             <a:fld id="{3916EF0B-21FF-479F-8051-9F9DC1DC802A}" type="datetimeFigureOut">
               <a:rPr lang="ko-KR" altLang="en-US" smtClean="0"/>
-              <a:t>2019-06-08</a:t>
+              <a:t>2019-06-19</a:t>
             </a:fld>
             <a:endParaRPr lang="ko-KR" altLang="en-US"/>
           </a:p>
@@ -2695,7 +2697,7 @@
           <a:p>
             <a:fld id="{3916EF0B-21FF-479F-8051-9F9DC1DC802A}" type="datetimeFigureOut">
               <a:rPr lang="ko-KR" altLang="en-US" smtClean="0"/>
-              <a:t>2019-06-08</a:t>
+              <a:t>2019-06-19</a:t>
             </a:fld>
             <a:endParaRPr lang="ko-KR" altLang="en-US"/>
           </a:p>
@@ -2938,7 +2940,7 @@
           <a:p>
             <a:fld id="{3916EF0B-21FF-479F-8051-9F9DC1DC802A}" type="datetimeFigureOut">
               <a:rPr lang="ko-KR" altLang="en-US" smtClean="0"/>
-              <a:t>2019-06-08</a:t>
+              <a:t>2019-06-19</a:t>
             </a:fld>
             <a:endParaRPr lang="ko-KR" altLang="en-US"/>
           </a:p>
@@ -3430,6 +3432,988 @@
 </p:sld>
 </file>
 
+<file path=ppt/slides/slide10.xml><?xml version="1.0" encoding="utf-8"?>
+<p:sld xmlns:a="http://schemas.openxmlformats.org/drawingml/2006/main" xmlns:r="http://schemas.openxmlformats.org/officeDocument/2006/relationships" xmlns:p="http://schemas.openxmlformats.org/presentationml/2006/main">
+  <p:cSld>
+    <p:spTree>
+      <p:nvGrpSpPr>
+        <p:cNvPr id="1" name=""/>
+        <p:cNvGrpSpPr/>
+        <p:nvPr/>
+      </p:nvGrpSpPr>
+      <p:grpSpPr>
+        <a:xfrm>
+          <a:off x="0" y="0"/>
+          <a:ext cx="0" cy="0"/>
+          <a:chOff x="0" y="0"/>
+          <a:chExt cx="0" cy="0"/>
+        </a:xfrm>
+      </p:grpSpPr>
+      <p:sp>
+        <p:nvSpPr>
+          <p:cNvPr id="2" name="Title 1">
+            <a:extLst>
+              <a:ext uri="{FF2B5EF4-FFF2-40B4-BE49-F238E27FC236}">
+                <a16:creationId xmlns:a16="http://schemas.microsoft.com/office/drawing/2014/main" id="{5CD19CA1-C696-4142-8CD2-BDEE6C1D97A9}"/>
+              </a:ext>
+            </a:extLst>
+          </p:cNvPr>
+          <p:cNvSpPr>
+            <a:spLocks noGrp="1"/>
+          </p:cNvSpPr>
+          <p:nvPr>
+            <p:ph type="title"/>
+          </p:nvPr>
+        </p:nvSpPr>
+        <p:spPr/>
+        <p:txBody>
+          <a:bodyPr/>
+          <a:lstStyle/>
+          <a:p>
+            <a:r>
+              <a:rPr lang="en-US" altLang="ko-KR" dirty="0"/>
+              <a:t>Process</a:t>
+            </a:r>
+            <a:endParaRPr lang="ko-KR" altLang="en-US" dirty="0"/>
+          </a:p>
+        </p:txBody>
+      </p:sp>
+      <p:sp>
+        <p:nvSpPr>
+          <p:cNvPr id="3" name="Content Placeholder 2">
+            <a:extLst>
+              <a:ext uri="{FF2B5EF4-FFF2-40B4-BE49-F238E27FC236}">
+                <a16:creationId xmlns:a16="http://schemas.microsoft.com/office/drawing/2014/main" id="{7E22FF0F-951B-4188-945C-F10EA5B55F31}"/>
+              </a:ext>
+            </a:extLst>
+          </p:cNvPr>
+          <p:cNvSpPr>
+            <a:spLocks noGrp="1"/>
+          </p:cNvSpPr>
+          <p:nvPr>
+            <p:ph idx="1"/>
+          </p:nvPr>
+        </p:nvSpPr>
+        <p:spPr/>
+        <p:txBody>
+          <a:bodyPr/>
+          <a:lstStyle/>
+          <a:p>
+            <a:r>
+              <a:rPr lang="en-US" altLang="ko-KR" dirty="0" err="1"/>
+              <a:t>Lexer</a:t>
+            </a:r>
+            <a:r>
+              <a:rPr lang="en-US" altLang="ko-KR" dirty="0"/>
+              <a:t> – Reads input(.</a:t>
+            </a:r>
+            <a:r>
+              <a:rPr lang="en-US" altLang="ko-KR" dirty="0" err="1"/>
+              <a:t>mdown</a:t>
+            </a:r>
+            <a:r>
+              <a:rPr lang="en-US" altLang="ko-KR" dirty="0"/>
+              <a:t>) and convert the text into tokens</a:t>
+            </a:r>
+          </a:p>
+          <a:p>
+            <a:endParaRPr lang="en-US" altLang="ko-KR" dirty="0"/>
+          </a:p>
+          <a:p>
+            <a:r>
+              <a:rPr lang="en-US" altLang="ko-KR" dirty="0"/>
+              <a:t>Generator – Writes output made with tokens(.md) which can be processed with SSG</a:t>
+            </a:r>
+          </a:p>
+          <a:p>
+            <a:endParaRPr lang="en-US" altLang="ko-KR" dirty="0"/>
+          </a:p>
+          <a:p>
+            <a:r>
+              <a:rPr lang="en-US" altLang="ko-KR" dirty="0"/>
+              <a:t>Note that parser is not needed since the input/output text is markup language, which doesn’t need to be an AST</a:t>
+            </a:r>
+            <a:endParaRPr lang="ko-KR" altLang="en-US" dirty="0"/>
+          </a:p>
+        </p:txBody>
+      </p:sp>
+    </p:spTree>
+    <p:extLst>
+      <p:ext uri="{BB962C8B-B14F-4D97-AF65-F5344CB8AC3E}">
+        <p14:creationId xmlns:p14="http://schemas.microsoft.com/office/powerpoint/2010/main" val="21262782"/>
+      </p:ext>
+    </p:extLst>
+  </p:cSld>
+  <p:clrMapOvr>
+    <a:masterClrMapping/>
+  </p:clrMapOvr>
+</p:sld>
+</file>
+
+<file path=ppt/slides/slide11.xml><?xml version="1.0" encoding="utf-8"?>
+<p:sld xmlns:a="http://schemas.openxmlformats.org/drawingml/2006/main" xmlns:r="http://schemas.openxmlformats.org/officeDocument/2006/relationships" xmlns:p="http://schemas.openxmlformats.org/presentationml/2006/main">
+  <p:cSld>
+    <p:spTree>
+      <p:nvGrpSpPr>
+        <p:cNvPr id="1" name=""/>
+        <p:cNvGrpSpPr/>
+        <p:nvPr/>
+      </p:nvGrpSpPr>
+      <p:grpSpPr>
+        <a:xfrm>
+          <a:off x="0" y="0"/>
+          <a:ext cx="0" cy="0"/>
+          <a:chOff x="0" y="0"/>
+          <a:chExt cx="0" cy="0"/>
+        </a:xfrm>
+      </p:grpSpPr>
+      <p:sp>
+        <p:nvSpPr>
+          <p:cNvPr id="2" name="Title 1">
+            <a:extLst>
+              <a:ext uri="{FF2B5EF4-FFF2-40B4-BE49-F238E27FC236}">
+                <a16:creationId xmlns:a16="http://schemas.microsoft.com/office/drawing/2014/main" id="{0AA12D00-4D4E-4365-A10D-30A5745394D1}"/>
+              </a:ext>
+            </a:extLst>
+          </p:cNvPr>
+          <p:cNvSpPr>
+            <a:spLocks noGrp="1"/>
+          </p:cNvSpPr>
+          <p:nvPr>
+            <p:ph type="title"/>
+          </p:nvPr>
+        </p:nvSpPr>
+        <p:spPr/>
+        <p:txBody>
+          <a:bodyPr/>
+          <a:lstStyle/>
+          <a:p>
+            <a:r>
+              <a:rPr lang="en-US" altLang="ko-KR" dirty="0"/>
+              <a:t>Process</a:t>
+            </a:r>
+            <a:endParaRPr lang="ko-KR" altLang="en-US" dirty="0"/>
+          </a:p>
+        </p:txBody>
+      </p:sp>
+      <p:sp>
+        <p:nvSpPr>
+          <p:cNvPr id="6" name="Rectangle 5">
+            <a:extLst>
+              <a:ext uri="{FF2B5EF4-FFF2-40B4-BE49-F238E27FC236}">
+                <a16:creationId xmlns:a16="http://schemas.microsoft.com/office/drawing/2014/main" id="{B1F21358-9F5D-4B3C-BCCA-665CB5B26337}"/>
+              </a:ext>
+            </a:extLst>
+          </p:cNvPr>
+          <p:cNvSpPr/>
+          <p:nvPr/>
+        </p:nvSpPr>
+        <p:spPr>
+          <a:xfrm>
+            <a:off x="5088971" y="3537452"/>
+            <a:ext cx="2014057" cy="1132514"/>
+          </a:xfrm>
+          <a:prstGeom prst="rect">
+            <a:avLst/>
+          </a:prstGeom>
+          <a:noFill/>
+          <a:ln>
+            <a:solidFill>
+              <a:schemeClr val="tx1"/>
+            </a:solidFill>
+          </a:ln>
+        </p:spPr>
+        <p:style>
+          <a:lnRef idx="2">
+            <a:schemeClr val="accent1">
+              <a:shade val="50000"/>
+            </a:schemeClr>
+          </a:lnRef>
+          <a:fillRef idx="1">
+            <a:schemeClr val="accent1"/>
+          </a:fillRef>
+          <a:effectRef idx="0">
+            <a:schemeClr val="accent1"/>
+          </a:effectRef>
+          <a:fontRef idx="minor">
+            <a:schemeClr val="lt1"/>
+          </a:fontRef>
+        </p:style>
+        <p:txBody>
+          <a:bodyPr rtlCol="0" anchor="ctr"/>
+          <a:lstStyle/>
+          <a:p>
+            <a:pPr algn="ctr"/>
+            <a:r>
+              <a:rPr lang="en-US" altLang="ko-KR" dirty="0">
+                <a:solidFill>
+                  <a:schemeClr val="tx1"/>
+                </a:solidFill>
+              </a:rPr>
+              <a:t>Read command, parameters</a:t>
+            </a:r>
+            <a:endParaRPr lang="ko-KR" altLang="en-US" dirty="0">
+              <a:solidFill>
+                <a:schemeClr val="tx1"/>
+              </a:solidFill>
+            </a:endParaRPr>
+          </a:p>
+        </p:txBody>
+      </p:sp>
+      <p:sp>
+        <p:nvSpPr>
+          <p:cNvPr id="7" name="Rectangle 6">
+            <a:extLst>
+              <a:ext uri="{FF2B5EF4-FFF2-40B4-BE49-F238E27FC236}">
+                <a16:creationId xmlns:a16="http://schemas.microsoft.com/office/drawing/2014/main" id="{BFA7F706-B97F-4916-BEA5-F8C8BADC4A3A}"/>
+              </a:ext>
+            </a:extLst>
+          </p:cNvPr>
+          <p:cNvSpPr/>
+          <p:nvPr/>
+        </p:nvSpPr>
+        <p:spPr>
+          <a:xfrm>
+            <a:off x="9339743" y="3537452"/>
+            <a:ext cx="2014057" cy="1132514"/>
+          </a:xfrm>
+          <a:prstGeom prst="rect">
+            <a:avLst/>
+          </a:prstGeom>
+          <a:noFill/>
+          <a:ln>
+            <a:solidFill>
+              <a:schemeClr val="tx1"/>
+            </a:solidFill>
+          </a:ln>
+        </p:spPr>
+        <p:style>
+          <a:lnRef idx="2">
+            <a:schemeClr val="accent1">
+              <a:shade val="50000"/>
+            </a:schemeClr>
+          </a:lnRef>
+          <a:fillRef idx="1">
+            <a:schemeClr val="accent1"/>
+          </a:fillRef>
+          <a:effectRef idx="0">
+            <a:schemeClr val="accent1"/>
+          </a:effectRef>
+          <a:fontRef idx="minor">
+            <a:schemeClr val="lt1"/>
+          </a:fontRef>
+        </p:style>
+        <p:txBody>
+          <a:bodyPr rtlCol="0" anchor="ctr"/>
+          <a:lstStyle/>
+          <a:p>
+            <a:pPr algn="ctr"/>
+            <a:r>
+              <a:rPr lang="en-US" altLang="ko-KR" dirty="0">
+                <a:solidFill>
+                  <a:schemeClr val="tx1"/>
+                </a:solidFill>
+              </a:rPr>
+              <a:t>Generate content</a:t>
+            </a:r>
+            <a:endParaRPr lang="ko-KR" altLang="en-US" dirty="0">
+              <a:solidFill>
+                <a:schemeClr val="tx1"/>
+              </a:solidFill>
+            </a:endParaRPr>
+          </a:p>
+        </p:txBody>
+      </p:sp>
+      <p:cxnSp>
+        <p:nvCxnSpPr>
+          <p:cNvPr id="42" name="Straight Arrow Connector 41">
+            <a:extLst>
+              <a:ext uri="{FF2B5EF4-FFF2-40B4-BE49-F238E27FC236}">
+                <a16:creationId xmlns:a16="http://schemas.microsoft.com/office/drawing/2014/main" id="{A381CC93-9500-4CBA-BDCC-CCCA0D15103C}"/>
+              </a:ext>
+            </a:extLst>
+          </p:cNvPr>
+          <p:cNvCxnSpPr>
+            <a:stCxn id="6" idx="3"/>
+            <a:endCxn id="7" idx="1"/>
+          </p:cNvCxnSpPr>
+          <p:nvPr/>
+        </p:nvCxnSpPr>
+        <p:spPr>
+          <a:xfrm>
+            <a:off x="7103028" y="4103709"/>
+            <a:ext cx="2236715" cy="0"/>
+          </a:xfrm>
+          <a:prstGeom prst="straightConnector1">
+            <a:avLst/>
+          </a:prstGeom>
+          <a:ln>
+            <a:headEnd type="triangle"/>
+            <a:tailEnd type="triangle"/>
+          </a:ln>
+        </p:spPr>
+        <p:style>
+          <a:lnRef idx="1">
+            <a:schemeClr val="dk1"/>
+          </a:lnRef>
+          <a:fillRef idx="0">
+            <a:schemeClr val="dk1"/>
+          </a:fillRef>
+          <a:effectRef idx="0">
+            <a:schemeClr val="dk1"/>
+          </a:effectRef>
+          <a:fontRef idx="minor">
+            <a:schemeClr val="tx1"/>
+          </a:fontRef>
+        </p:style>
+      </p:cxnSp>
+      <p:grpSp>
+        <p:nvGrpSpPr>
+          <p:cNvPr id="55" name="Group 54">
+            <a:extLst>
+              <a:ext uri="{FF2B5EF4-FFF2-40B4-BE49-F238E27FC236}">
+                <a16:creationId xmlns:a16="http://schemas.microsoft.com/office/drawing/2014/main" id="{E897FF2B-D812-4661-84F4-B7D9DD58066A}"/>
+              </a:ext>
+            </a:extLst>
+          </p:cNvPr>
+          <p:cNvGrpSpPr/>
+          <p:nvPr/>
+        </p:nvGrpSpPr>
+        <p:grpSpPr>
+          <a:xfrm>
+            <a:off x="838200" y="1690688"/>
+            <a:ext cx="2207004" cy="1304640"/>
+            <a:chOff x="1464927" y="2290194"/>
+            <a:chExt cx="2207004" cy="1304640"/>
+          </a:xfrm>
+        </p:grpSpPr>
+        <p:sp>
+          <p:nvSpPr>
+            <p:cNvPr id="4" name="Rectangle 3">
+              <a:extLst>
+                <a:ext uri="{FF2B5EF4-FFF2-40B4-BE49-F238E27FC236}">
+                  <a16:creationId xmlns:a16="http://schemas.microsoft.com/office/drawing/2014/main" id="{1DAA323B-783E-4AFC-B883-62186D3AC04C}"/>
+                </a:ext>
+              </a:extLst>
+            </p:cNvPr>
+            <p:cNvSpPr/>
+            <p:nvPr/>
+          </p:nvSpPr>
+          <p:spPr>
+            <a:xfrm>
+              <a:off x="1464927" y="2462320"/>
+              <a:ext cx="2014057" cy="1132514"/>
+            </a:xfrm>
+            <a:prstGeom prst="rect">
+              <a:avLst/>
+            </a:prstGeom>
+            <a:noFill/>
+            <a:ln>
+              <a:solidFill>
+                <a:schemeClr val="tx1"/>
+              </a:solidFill>
+            </a:ln>
+          </p:spPr>
+          <p:style>
+            <a:lnRef idx="2">
+              <a:schemeClr val="accent1">
+                <a:shade val="50000"/>
+              </a:schemeClr>
+            </a:lnRef>
+            <a:fillRef idx="1">
+              <a:schemeClr val="accent1"/>
+            </a:fillRef>
+            <a:effectRef idx="0">
+              <a:schemeClr val="accent1"/>
+            </a:effectRef>
+            <a:fontRef idx="minor">
+              <a:schemeClr val="lt1"/>
+            </a:fontRef>
+          </p:style>
+          <p:txBody>
+            <a:bodyPr rtlCol="0" anchor="ctr"/>
+            <a:lstStyle/>
+            <a:p>
+              <a:pPr algn="ctr"/>
+              <a:r>
+                <a:rPr lang="en-US" altLang="ko-KR" dirty="0">
+                  <a:solidFill>
+                    <a:schemeClr val="tx1"/>
+                  </a:solidFill>
+                </a:rPr>
+                <a:t>Generate</a:t>
+              </a:r>
+            </a:p>
+            <a:p>
+              <a:pPr algn="ctr"/>
+              <a:r>
+                <a:rPr lang="en-US" altLang="ko-KR" dirty="0">
+                  <a:solidFill>
+                    <a:schemeClr val="tx1"/>
+                  </a:solidFill>
+                </a:rPr>
+                <a:t>front-matter</a:t>
+              </a:r>
+              <a:endParaRPr lang="ko-KR" altLang="en-US" dirty="0">
+                <a:solidFill>
+                  <a:schemeClr val="tx1"/>
+                </a:solidFill>
+              </a:endParaRPr>
+            </a:p>
+          </p:txBody>
+        </p:sp>
+        <p:sp>
+          <p:nvSpPr>
+            <p:cNvPr id="54" name="Star: 5 Points 53">
+              <a:extLst>
+                <a:ext uri="{FF2B5EF4-FFF2-40B4-BE49-F238E27FC236}">
+                  <a16:creationId xmlns:a16="http://schemas.microsoft.com/office/drawing/2014/main" id="{65448BDE-05B9-4112-B261-456D4C7E45C9}"/>
+                </a:ext>
+              </a:extLst>
+            </p:cNvPr>
+            <p:cNvSpPr/>
+            <p:nvPr/>
+          </p:nvSpPr>
+          <p:spPr>
+            <a:xfrm>
+              <a:off x="3286037" y="2290194"/>
+              <a:ext cx="385894" cy="385894"/>
+            </a:xfrm>
+            <a:prstGeom prst="star5">
+              <a:avLst/>
+            </a:prstGeom>
+            <a:solidFill>
+              <a:srgbClr val="FFFF00"/>
+            </a:solidFill>
+            <a:ln>
+              <a:solidFill>
+                <a:srgbClr val="FFFF00"/>
+              </a:solidFill>
+            </a:ln>
+          </p:spPr>
+          <p:style>
+            <a:lnRef idx="2">
+              <a:schemeClr val="accent1">
+                <a:shade val="50000"/>
+              </a:schemeClr>
+            </a:lnRef>
+            <a:fillRef idx="1">
+              <a:schemeClr val="accent1"/>
+            </a:fillRef>
+            <a:effectRef idx="0">
+              <a:schemeClr val="accent1"/>
+            </a:effectRef>
+            <a:fontRef idx="minor">
+              <a:schemeClr val="lt1"/>
+            </a:fontRef>
+          </p:style>
+          <p:txBody>
+            <a:bodyPr rtlCol="0" anchor="ctr"/>
+            <a:lstStyle/>
+            <a:p>
+              <a:pPr algn="ctr"/>
+              <a:endParaRPr lang="ko-KR" altLang="en-US"/>
+            </a:p>
+          </p:txBody>
+        </p:sp>
+      </p:grpSp>
+      <p:sp>
+        <p:nvSpPr>
+          <p:cNvPr id="60" name="Flowchart: Decision 59">
+            <a:extLst>
+              <a:ext uri="{FF2B5EF4-FFF2-40B4-BE49-F238E27FC236}">
+                <a16:creationId xmlns:a16="http://schemas.microsoft.com/office/drawing/2014/main" id="{6561D93B-A9F5-407C-8990-28B0C0A6EE9B}"/>
+              </a:ext>
+            </a:extLst>
+          </p:cNvPr>
+          <p:cNvSpPr/>
+          <p:nvPr/>
+        </p:nvSpPr>
+        <p:spPr>
+          <a:xfrm>
+            <a:off x="838200" y="3429000"/>
+            <a:ext cx="2014057" cy="1349418"/>
+          </a:xfrm>
+          <a:prstGeom prst="flowChartDecision">
+            <a:avLst/>
+          </a:prstGeom>
+          <a:noFill/>
+          <a:ln>
+            <a:solidFill>
+              <a:schemeClr val="tx1"/>
+            </a:solidFill>
+          </a:ln>
+        </p:spPr>
+        <p:style>
+          <a:lnRef idx="2">
+            <a:schemeClr val="accent1">
+              <a:shade val="50000"/>
+            </a:schemeClr>
+          </a:lnRef>
+          <a:fillRef idx="1">
+            <a:schemeClr val="accent1"/>
+          </a:fillRef>
+          <a:effectRef idx="0">
+            <a:schemeClr val="accent1"/>
+          </a:effectRef>
+          <a:fontRef idx="minor">
+            <a:schemeClr val="lt1"/>
+          </a:fontRef>
+        </p:style>
+        <p:txBody>
+          <a:bodyPr rtlCol="0" anchor="ctr"/>
+          <a:lstStyle/>
+          <a:p>
+            <a:pPr algn="ctr"/>
+            <a:r>
+              <a:rPr lang="en-US" altLang="ko-KR">
+                <a:solidFill>
+                  <a:schemeClr val="tx1"/>
+                </a:solidFill>
+              </a:rPr>
+              <a:t>Prep </a:t>
+            </a:r>
+            <a:r>
+              <a:rPr lang="en-US" altLang="ko-KR" dirty="0">
+                <a:solidFill>
+                  <a:schemeClr val="tx1"/>
+                </a:solidFill>
+              </a:rPr>
+              <a:t>is on</a:t>
+            </a:r>
+            <a:endParaRPr lang="ko-KR" altLang="en-US" dirty="0">
+              <a:solidFill>
+                <a:schemeClr val="tx1"/>
+              </a:solidFill>
+            </a:endParaRPr>
+          </a:p>
+        </p:txBody>
+      </p:sp>
+      <p:cxnSp>
+        <p:nvCxnSpPr>
+          <p:cNvPr id="65" name="Straight Arrow Connector 64">
+            <a:extLst>
+              <a:ext uri="{FF2B5EF4-FFF2-40B4-BE49-F238E27FC236}">
+                <a16:creationId xmlns:a16="http://schemas.microsoft.com/office/drawing/2014/main" id="{458965F2-6F1B-4417-B824-4B97196FC0C4}"/>
+              </a:ext>
+            </a:extLst>
+          </p:cNvPr>
+          <p:cNvCxnSpPr>
+            <a:stCxn id="4" idx="2"/>
+            <a:endCxn id="60" idx="0"/>
+          </p:cNvCxnSpPr>
+          <p:nvPr/>
+        </p:nvCxnSpPr>
+        <p:spPr>
+          <a:xfrm>
+            <a:off x="1845229" y="2995328"/>
+            <a:ext cx="0" cy="433672"/>
+          </a:xfrm>
+          <a:prstGeom prst="straightConnector1">
+            <a:avLst/>
+          </a:prstGeom>
+          <a:ln>
+            <a:tailEnd type="triangle"/>
+          </a:ln>
+        </p:spPr>
+        <p:style>
+          <a:lnRef idx="1">
+            <a:schemeClr val="dk1"/>
+          </a:lnRef>
+          <a:fillRef idx="0">
+            <a:schemeClr val="dk1"/>
+          </a:fillRef>
+          <a:effectRef idx="0">
+            <a:schemeClr val="dk1"/>
+          </a:effectRef>
+          <a:fontRef idx="minor">
+            <a:schemeClr val="tx1"/>
+          </a:fontRef>
+        </p:style>
+      </p:cxnSp>
+      <p:cxnSp>
+        <p:nvCxnSpPr>
+          <p:cNvPr id="67" name="Straight Arrow Connector 66">
+            <a:extLst>
+              <a:ext uri="{FF2B5EF4-FFF2-40B4-BE49-F238E27FC236}">
+                <a16:creationId xmlns:a16="http://schemas.microsoft.com/office/drawing/2014/main" id="{55DBE3FF-BB6F-465B-94EC-63FEFD43F425}"/>
+              </a:ext>
+            </a:extLst>
+          </p:cNvPr>
+          <p:cNvCxnSpPr>
+            <a:stCxn id="60" idx="3"/>
+            <a:endCxn id="6" idx="1"/>
+          </p:cNvCxnSpPr>
+          <p:nvPr/>
+        </p:nvCxnSpPr>
+        <p:spPr>
+          <a:xfrm>
+            <a:off x="2852257" y="4103709"/>
+            <a:ext cx="2236714" cy="0"/>
+          </a:xfrm>
+          <a:prstGeom prst="straightConnector1">
+            <a:avLst/>
+          </a:prstGeom>
+          <a:ln>
+            <a:tailEnd type="triangle"/>
+          </a:ln>
+        </p:spPr>
+        <p:style>
+          <a:lnRef idx="1">
+            <a:schemeClr val="dk1"/>
+          </a:lnRef>
+          <a:fillRef idx="0">
+            <a:schemeClr val="dk1"/>
+          </a:fillRef>
+          <a:effectRef idx="0">
+            <a:schemeClr val="dk1"/>
+          </a:effectRef>
+          <a:fontRef idx="minor">
+            <a:schemeClr val="tx1"/>
+          </a:fontRef>
+        </p:style>
+      </p:cxnSp>
+      <p:sp>
+        <p:nvSpPr>
+          <p:cNvPr id="70" name="TextBox 69">
+            <a:extLst>
+              <a:ext uri="{FF2B5EF4-FFF2-40B4-BE49-F238E27FC236}">
+                <a16:creationId xmlns:a16="http://schemas.microsoft.com/office/drawing/2014/main" id="{C03888C4-B877-4160-98D4-44E089172FD5}"/>
+              </a:ext>
+            </a:extLst>
+          </p:cNvPr>
+          <p:cNvSpPr txBox="1"/>
+          <p:nvPr/>
+        </p:nvSpPr>
+        <p:spPr>
+          <a:xfrm>
+            <a:off x="2787473" y="3754637"/>
+            <a:ext cx="515462" cy="369332"/>
+          </a:xfrm>
+          <a:prstGeom prst="rect">
+            <a:avLst/>
+          </a:prstGeom>
+          <a:noFill/>
+        </p:spPr>
+        <p:txBody>
+          <a:bodyPr wrap="none" rtlCol="0">
+            <a:spAutoFit/>
+          </a:bodyPr>
+          <a:lstStyle/>
+          <a:p>
+            <a:r>
+              <a:rPr lang="en-US" altLang="ko-KR" dirty="0"/>
+              <a:t>Yes</a:t>
+            </a:r>
+            <a:endParaRPr lang="ko-KR" altLang="en-US" dirty="0"/>
+          </a:p>
+        </p:txBody>
+      </p:sp>
+      <p:sp>
+        <p:nvSpPr>
+          <p:cNvPr id="71" name="TextBox 70">
+            <a:extLst>
+              <a:ext uri="{FF2B5EF4-FFF2-40B4-BE49-F238E27FC236}">
+                <a16:creationId xmlns:a16="http://schemas.microsoft.com/office/drawing/2014/main" id="{A28BED2B-0485-47E7-88FD-FED3DE7C23D5}"/>
+              </a:ext>
+            </a:extLst>
+          </p:cNvPr>
+          <p:cNvSpPr txBox="1"/>
+          <p:nvPr/>
+        </p:nvSpPr>
+        <p:spPr>
+          <a:xfrm>
+            <a:off x="1849887" y="4778418"/>
+            <a:ext cx="498855" cy="369332"/>
+          </a:xfrm>
+          <a:prstGeom prst="rect">
+            <a:avLst/>
+          </a:prstGeom>
+          <a:noFill/>
+        </p:spPr>
+        <p:txBody>
+          <a:bodyPr wrap="none" rtlCol="0">
+            <a:spAutoFit/>
+          </a:bodyPr>
+          <a:lstStyle/>
+          <a:p>
+            <a:r>
+              <a:rPr lang="en-US" altLang="ko-KR" dirty="0"/>
+              <a:t>No</a:t>
+            </a:r>
+            <a:endParaRPr lang="ko-KR" altLang="en-US" dirty="0"/>
+          </a:p>
+        </p:txBody>
+      </p:sp>
+      <p:sp>
+        <p:nvSpPr>
+          <p:cNvPr id="72" name="Rectangle 71">
+            <a:extLst>
+              <a:ext uri="{FF2B5EF4-FFF2-40B4-BE49-F238E27FC236}">
+                <a16:creationId xmlns:a16="http://schemas.microsoft.com/office/drawing/2014/main" id="{F89FF27F-6D81-4C08-872A-2850C17C26D0}"/>
+              </a:ext>
+            </a:extLst>
+          </p:cNvPr>
+          <p:cNvSpPr/>
+          <p:nvPr/>
+        </p:nvSpPr>
+        <p:spPr>
+          <a:xfrm>
+            <a:off x="838199" y="5212090"/>
+            <a:ext cx="2014057" cy="1132514"/>
+          </a:xfrm>
+          <a:prstGeom prst="rect">
+            <a:avLst/>
+          </a:prstGeom>
+          <a:noFill/>
+          <a:ln>
+            <a:solidFill>
+              <a:schemeClr val="tx1"/>
+            </a:solidFill>
+          </a:ln>
+        </p:spPr>
+        <p:style>
+          <a:lnRef idx="2">
+            <a:schemeClr val="accent1">
+              <a:shade val="50000"/>
+            </a:schemeClr>
+          </a:lnRef>
+          <a:fillRef idx="1">
+            <a:schemeClr val="accent1"/>
+          </a:fillRef>
+          <a:effectRef idx="0">
+            <a:schemeClr val="accent1"/>
+          </a:effectRef>
+          <a:fontRef idx="minor">
+            <a:schemeClr val="lt1"/>
+          </a:fontRef>
+        </p:style>
+        <p:txBody>
+          <a:bodyPr rtlCol="0" anchor="ctr"/>
+          <a:lstStyle/>
+          <a:p>
+            <a:pPr algn="ctr"/>
+            <a:r>
+              <a:rPr lang="en-US" altLang="ko-KR" dirty="0">
+                <a:solidFill>
+                  <a:schemeClr val="tx1"/>
+                </a:solidFill>
+              </a:rPr>
+              <a:t>Turn prep on when token is found</a:t>
+            </a:r>
+            <a:endParaRPr lang="ko-KR" altLang="en-US" dirty="0">
+              <a:solidFill>
+                <a:schemeClr val="tx1"/>
+              </a:solidFill>
+            </a:endParaRPr>
+          </a:p>
+        </p:txBody>
+      </p:sp>
+      <p:cxnSp>
+        <p:nvCxnSpPr>
+          <p:cNvPr id="74" name="Straight Arrow Connector 73">
+            <a:extLst>
+              <a:ext uri="{FF2B5EF4-FFF2-40B4-BE49-F238E27FC236}">
+                <a16:creationId xmlns:a16="http://schemas.microsoft.com/office/drawing/2014/main" id="{476956ED-5F33-4136-925F-E96F227E17DD}"/>
+              </a:ext>
+            </a:extLst>
+          </p:cNvPr>
+          <p:cNvCxnSpPr>
+            <a:stCxn id="60" idx="2"/>
+            <a:endCxn id="72" idx="0"/>
+          </p:cNvCxnSpPr>
+          <p:nvPr/>
+        </p:nvCxnSpPr>
+        <p:spPr>
+          <a:xfrm flipH="1">
+            <a:off x="1845228" y="4778418"/>
+            <a:ext cx="1" cy="433672"/>
+          </a:xfrm>
+          <a:prstGeom prst="straightConnector1">
+            <a:avLst/>
+          </a:prstGeom>
+          <a:ln>
+            <a:tailEnd type="triangle"/>
+          </a:ln>
+        </p:spPr>
+        <p:style>
+          <a:lnRef idx="1">
+            <a:schemeClr val="dk1"/>
+          </a:lnRef>
+          <a:fillRef idx="0">
+            <a:schemeClr val="dk1"/>
+          </a:fillRef>
+          <a:effectRef idx="0">
+            <a:schemeClr val="dk1"/>
+          </a:effectRef>
+          <a:fontRef idx="minor">
+            <a:schemeClr val="tx1"/>
+          </a:fontRef>
+        </p:style>
+      </p:cxnSp>
+      <p:cxnSp>
+        <p:nvCxnSpPr>
+          <p:cNvPr id="76" name="Connector: Elbow 75">
+            <a:extLst>
+              <a:ext uri="{FF2B5EF4-FFF2-40B4-BE49-F238E27FC236}">
+                <a16:creationId xmlns:a16="http://schemas.microsoft.com/office/drawing/2014/main" id="{FEA556A9-DE47-41F7-9AE9-67C179AC1EB8}"/>
+              </a:ext>
+            </a:extLst>
+          </p:cNvPr>
+          <p:cNvCxnSpPr>
+            <a:stCxn id="72" idx="1"/>
+            <a:endCxn id="60" idx="1"/>
+          </p:cNvCxnSpPr>
+          <p:nvPr/>
+        </p:nvCxnSpPr>
+        <p:spPr>
+          <a:xfrm rot="10800000" flipH="1">
+            <a:off x="838198" y="4103709"/>
+            <a:ext cx="1" cy="1674638"/>
+          </a:xfrm>
+          <a:prstGeom prst="bentConnector3">
+            <a:avLst>
+              <a:gd name="adj1" fmla="val -22860000000"/>
+            </a:avLst>
+          </a:prstGeom>
+          <a:ln>
+            <a:tailEnd type="triangle"/>
+          </a:ln>
+        </p:spPr>
+        <p:style>
+          <a:lnRef idx="1">
+            <a:schemeClr val="dk1"/>
+          </a:lnRef>
+          <a:fillRef idx="0">
+            <a:schemeClr val="dk1"/>
+          </a:fillRef>
+          <a:effectRef idx="0">
+            <a:schemeClr val="dk1"/>
+          </a:effectRef>
+          <a:fontRef idx="minor">
+            <a:schemeClr val="tx1"/>
+          </a:fontRef>
+        </p:style>
+      </p:cxnSp>
+      <p:sp>
+        <p:nvSpPr>
+          <p:cNvPr id="77" name="Rectangle 76">
+            <a:extLst>
+              <a:ext uri="{FF2B5EF4-FFF2-40B4-BE49-F238E27FC236}">
+                <a16:creationId xmlns:a16="http://schemas.microsoft.com/office/drawing/2014/main" id="{80F8CBA9-F703-45BD-BC1B-07E6FD816F78}"/>
+              </a:ext>
+            </a:extLst>
+          </p:cNvPr>
+          <p:cNvSpPr/>
+          <p:nvPr/>
+        </p:nvSpPr>
+        <p:spPr>
+          <a:xfrm>
+            <a:off x="9339743" y="5212090"/>
+            <a:ext cx="2014057" cy="1132514"/>
+          </a:xfrm>
+          <a:prstGeom prst="rect">
+            <a:avLst/>
+          </a:prstGeom>
+          <a:noFill/>
+          <a:ln>
+            <a:solidFill>
+              <a:schemeClr val="tx1"/>
+            </a:solidFill>
+          </a:ln>
+        </p:spPr>
+        <p:style>
+          <a:lnRef idx="2">
+            <a:schemeClr val="accent1">
+              <a:shade val="50000"/>
+            </a:schemeClr>
+          </a:lnRef>
+          <a:fillRef idx="1">
+            <a:schemeClr val="accent1"/>
+          </a:fillRef>
+          <a:effectRef idx="0">
+            <a:schemeClr val="accent1"/>
+          </a:effectRef>
+          <a:fontRef idx="minor">
+            <a:schemeClr val="lt1"/>
+          </a:fontRef>
+        </p:style>
+        <p:txBody>
+          <a:bodyPr rtlCol="0" anchor="ctr"/>
+          <a:lstStyle/>
+          <a:p>
+            <a:pPr algn="ctr"/>
+            <a:r>
+              <a:rPr lang="en-US" altLang="ko-KR" dirty="0">
+                <a:solidFill>
+                  <a:schemeClr val="tx1"/>
+                </a:solidFill>
+              </a:rPr>
+              <a:t>Output result in file</a:t>
+            </a:r>
+            <a:endParaRPr lang="ko-KR" altLang="en-US" dirty="0">
+              <a:solidFill>
+                <a:schemeClr val="tx1"/>
+              </a:solidFill>
+            </a:endParaRPr>
+          </a:p>
+        </p:txBody>
+      </p:sp>
+      <p:cxnSp>
+        <p:nvCxnSpPr>
+          <p:cNvPr id="79" name="Straight Arrow Connector 78">
+            <a:extLst>
+              <a:ext uri="{FF2B5EF4-FFF2-40B4-BE49-F238E27FC236}">
+                <a16:creationId xmlns:a16="http://schemas.microsoft.com/office/drawing/2014/main" id="{53BE48DD-8C58-46AA-973E-E07432F0452F}"/>
+              </a:ext>
+            </a:extLst>
+          </p:cNvPr>
+          <p:cNvCxnSpPr>
+            <a:stCxn id="7" idx="2"/>
+            <a:endCxn id="77" idx="0"/>
+          </p:cNvCxnSpPr>
+          <p:nvPr/>
+        </p:nvCxnSpPr>
+        <p:spPr>
+          <a:xfrm>
+            <a:off x="10346772" y="4669966"/>
+            <a:ext cx="0" cy="542124"/>
+          </a:xfrm>
+          <a:prstGeom prst="straightConnector1">
+            <a:avLst/>
+          </a:prstGeom>
+          <a:ln>
+            <a:tailEnd type="triangle"/>
+          </a:ln>
+        </p:spPr>
+        <p:style>
+          <a:lnRef idx="1">
+            <a:schemeClr val="dk1"/>
+          </a:lnRef>
+          <a:fillRef idx="0">
+            <a:schemeClr val="dk1"/>
+          </a:fillRef>
+          <a:effectRef idx="0">
+            <a:schemeClr val="dk1"/>
+          </a:effectRef>
+          <a:fontRef idx="minor">
+            <a:schemeClr val="tx1"/>
+          </a:fontRef>
+        </p:style>
+      </p:cxnSp>
+    </p:spTree>
+    <p:extLst>
+      <p:ext uri="{BB962C8B-B14F-4D97-AF65-F5344CB8AC3E}">
+        <p14:creationId xmlns:p14="http://schemas.microsoft.com/office/powerpoint/2010/main" val="2748259833"/>
+      </p:ext>
+    </p:extLst>
+  </p:cSld>
+  <p:clrMapOvr>
+    <a:masterClrMapping/>
+  </p:clrMapOvr>
+</p:sld>
+</file>
+
 <file path=ppt/slides/slide2.xml><?xml version="1.0" encoding="utf-8"?>
 <p:sld xmlns:a="http://schemas.openxmlformats.org/drawingml/2006/main" xmlns:r="http://schemas.openxmlformats.org/officeDocument/2006/relationships" xmlns:p="http://schemas.openxmlformats.org/presentationml/2006/main">
   <p:cSld>
@@ -4282,7 +5266,7 @@
           <p:cNvPr id="2" name="Title 1">
             <a:extLst>
               <a:ext uri="{FF2B5EF4-FFF2-40B4-BE49-F238E27FC236}">
-                <a16:creationId xmlns:a16="http://schemas.microsoft.com/office/drawing/2014/main" id="{5CD19CA1-C696-4142-8CD2-BDEE6C1D97A9}"/>
+                <a16:creationId xmlns:a16="http://schemas.microsoft.com/office/drawing/2014/main" id="{BCB0F4ED-1704-4882-B07E-514CEE0B10F8}"/>
               </a:ext>
             </a:extLst>
           </p:cNvPr>
@@ -4300,7 +5284,7 @@
           <a:p>
             <a:r>
               <a:rPr lang="en-US" altLang="ko-KR" dirty="0"/>
-              <a:t>Process</a:t>
+              <a:t>Syntax</a:t>
             </a:r>
             <a:endParaRPr lang="ko-KR" altLang="en-US" dirty="0"/>
           </a:p>
@@ -4311,7 +5295,7 @@
           <p:cNvPr id="3" name="Content Placeholder 2">
             <a:extLst>
               <a:ext uri="{FF2B5EF4-FFF2-40B4-BE49-F238E27FC236}">
-                <a16:creationId xmlns:a16="http://schemas.microsoft.com/office/drawing/2014/main" id="{7E22FF0F-951B-4188-945C-F10EA5B55F31}"/>
+                <a16:creationId xmlns:a16="http://schemas.microsoft.com/office/drawing/2014/main" id="{E0C8E1C0-B0EE-4660-96BA-CCD04C32FA21}"/>
               </a:ext>
             </a:extLst>
           </p:cNvPr>
@@ -4328,20 +5312,14 @@
           <a:lstStyle/>
           <a:p>
             <a:r>
-              <a:rPr lang="en-US" altLang="ko-KR" dirty="0" err="1"/>
-              <a:t>Lexer</a:t>
+              <a:rPr lang="en-US" altLang="ko-KR" dirty="0">
+                <a:hlinkClick r:id="rId2"/>
+              </a:rPr>
+              <a:t>TOML</a:t>
             </a:r>
             <a:r>
               <a:rPr lang="en-US" altLang="ko-KR" dirty="0"/>
-              <a:t> – Reads input(.</a:t>
-            </a:r>
-            <a:r>
-              <a:rPr lang="en-US" altLang="ko-KR" dirty="0" err="1"/>
-              <a:t>mdown</a:t>
-            </a:r>
-            <a:r>
-              <a:rPr lang="en-US" altLang="ko-KR" dirty="0"/>
-              <a:t>) and convert the text into tokens</a:t>
+              <a:t>-compatible</a:t>
             </a:r>
           </a:p>
           <a:p>
@@ -4349,18 +5327,29 @@
           </a:p>
           <a:p>
             <a:r>
-              <a:rPr lang="en-US" altLang="ko-KR" dirty="0"/>
-              <a:t>Generator – Writes output made with tokens(.md) which can be processed with SSG</a:t>
-            </a:r>
-          </a:p>
-          <a:p>
+              <a:rPr lang="en-US" altLang="ko-KR" dirty="0">
+                <a:hlinkClick r:id="rId3"/>
+              </a:rPr>
+              <a:t>https://github.com/alexcrichton/toml-rs</a:t>
+            </a:r>
             <a:endParaRPr lang="en-US" altLang="ko-KR" dirty="0"/>
           </a:p>
           <a:p>
-            <a:r>
-              <a:rPr lang="en-US" altLang="ko-KR" dirty="0"/>
-              <a:t>Note that parser is not needed since the input/output text is markup language, which doesn’t need to be an AST</a:t>
-            </a:r>
+            <a:endParaRPr lang="en-US" altLang="ko-KR" dirty="0"/>
+          </a:p>
+          <a:p>
+            <a:r>
+              <a:rPr lang="en-US" altLang="ko-KR" dirty="0">
+                <a:hlinkClick r:id="rId4"/>
+              </a:rPr>
+              <a:t>Tera - A powerful, easy to use template engine for Rust</a:t>
+            </a:r>
+            <a:endParaRPr lang="en-US" altLang="ko-KR" dirty="0"/>
+          </a:p>
+          <a:p>
+            <a:endParaRPr lang="en-US" altLang="ko-KR" dirty="0"/>
+          </a:p>
+          <a:p>
             <a:endParaRPr lang="ko-KR" altLang="en-US" dirty="0"/>
           </a:p>
         </p:txBody>
@@ -4368,7 +5357,7 @@
     </p:spTree>
     <p:extLst>
       <p:ext uri="{BB962C8B-B14F-4D97-AF65-F5344CB8AC3E}">
-        <p14:creationId xmlns:p14="http://schemas.microsoft.com/office/powerpoint/2010/main" val="21262782"/>
+        <p14:creationId xmlns:p14="http://schemas.microsoft.com/office/powerpoint/2010/main" val="868906285"/>
       </p:ext>
     </p:extLst>
   </p:cSld>
@@ -4400,7 +5389,7 @@
           <p:cNvPr id="2" name="Title 1">
             <a:extLst>
               <a:ext uri="{FF2B5EF4-FFF2-40B4-BE49-F238E27FC236}">
-                <a16:creationId xmlns:a16="http://schemas.microsoft.com/office/drawing/2014/main" id="{BCB0F4ED-1704-4882-B07E-514CEE0B10F8}"/>
+                <a16:creationId xmlns:a16="http://schemas.microsoft.com/office/drawing/2014/main" id="{A8D790CB-E89A-4768-9057-68237A0154D6}"/>
               </a:ext>
             </a:extLst>
           </p:cNvPr>
@@ -4417,43 +5406,56 @@
           <a:lstStyle/>
           <a:p>
             <a:r>
+              <a:rPr lang="en-US" altLang="ko-KR" dirty="0" err="1"/>
+              <a:t>Todo</a:t>
+            </a:r>
+            <a:endParaRPr lang="ko-KR" altLang="en-US" dirty="0"/>
+          </a:p>
+        </p:txBody>
+      </p:sp>
+      <p:sp>
+        <p:nvSpPr>
+          <p:cNvPr id="3" name="Content Placeholder 2">
+            <a:extLst>
+              <a:ext uri="{FF2B5EF4-FFF2-40B4-BE49-F238E27FC236}">
+                <a16:creationId xmlns:a16="http://schemas.microsoft.com/office/drawing/2014/main" id="{EB356E25-D6C1-4BC6-AF9D-6A9F337F383F}"/>
+              </a:ext>
+            </a:extLst>
+          </p:cNvPr>
+          <p:cNvSpPr>
+            <a:spLocks noGrp="1"/>
+          </p:cNvSpPr>
+          <p:nvPr>
+            <p:ph idx="1"/>
+          </p:nvPr>
+        </p:nvSpPr>
+        <p:spPr/>
+        <p:txBody>
+          <a:bodyPr>
+            <a:normAutofit lnSpcReduction="10000"/>
+          </a:bodyPr>
+          <a:lstStyle/>
+          <a:p>
+            <a:r>
+              <a:rPr lang="en-US" altLang="ko-KR" dirty="0" err="1"/>
+              <a:t>Practise</a:t>
+            </a:r>
+            <a:r>
               <a:rPr lang="en-US" altLang="ko-KR" dirty="0"/>
-              <a:t>Syntax</a:t>
-            </a:r>
-            <a:endParaRPr lang="ko-KR" altLang="en-US" dirty="0"/>
-          </a:p>
-        </p:txBody>
-      </p:sp>
-      <p:sp>
-        <p:nvSpPr>
-          <p:cNvPr id="3" name="Content Placeholder 2">
-            <a:extLst>
-              <a:ext uri="{FF2B5EF4-FFF2-40B4-BE49-F238E27FC236}">
-                <a16:creationId xmlns:a16="http://schemas.microsoft.com/office/drawing/2014/main" id="{E0C8E1C0-B0EE-4660-96BA-CCD04C32FA21}"/>
-              </a:ext>
-            </a:extLst>
-          </p:cNvPr>
-          <p:cNvSpPr>
-            <a:spLocks noGrp="1"/>
-          </p:cNvSpPr>
-          <p:nvPr>
-            <p:ph idx="1"/>
-          </p:nvPr>
-        </p:nvSpPr>
-        <p:spPr/>
-        <p:txBody>
-          <a:bodyPr/>
-          <a:lstStyle/>
-          <a:p>
-            <a:r>
-              <a:rPr lang="en-US" altLang="ko-KR" dirty="0">
-                <a:hlinkClick r:id="rId2"/>
-              </a:rPr>
-              <a:t>TOML</a:t>
+              <a:t> Rust(MVP : File I/O)</a:t>
+            </a:r>
+          </a:p>
+          <a:p>
+            <a:endParaRPr lang="en-US" altLang="ko-KR" dirty="0"/>
+          </a:p>
+          <a:p>
+            <a:r>
+              <a:rPr lang="en-US" altLang="ko-KR" dirty="0" err="1"/>
+              <a:t>Analyse</a:t>
             </a:r>
             <a:r>
               <a:rPr lang="en-US" altLang="ko-KR" dirty="0"/>
-              <a:t>-compatible</a:t>
+              <a:t> markdown structure</a:t>
             </a:r>
           </a:p>
           <a:p>
@@ -4461,25 +5463,34 @@
           </a:p>
           <a:p>
             <a:r>
-              <a:rPr lang="en-US" altLang="ko-KR" dirty="0">
-                <a:hlinkClick r:id="rId3"/>
-              </a:rPr>
-              <a:t>https://github.com/alexcrichton/toml-rs</a:t>
-            </a:r>
+              <a:rPr lang="en-US" altLang="ko-KR" dirty="0"/>
+              <a:t>Set features to implement</a:t>
+            </a:r>
+          </a:p>
+          <a:p>
             <a:endParaRPr lang="en-US" altLang="ko-KR" dirty="0"/>
           </a:p>
           <a:p>
+            <a:r>
+              <a:rPr lang="en-US" altLang="ko-KR" dirty="0"/>
+              <a:t>Research about Travis</a:t>
+            </a:r>
+          </a:p>
+          <a:p>
             <a:endParaRPr lang="en-US" altLang="ko-KR" dirty="0"/>
           </a:p>
           <a:p>
-            <a:endParaRPr lang="ko-KR" altLang="en-US" dirty="0"/>
+            <a:r>
+              <a:rPr lang="en-US" altLang="ko-KR" dirty="0"/>
+              <a:t>Design and confirm build process</a:t>
+            </a:r>
           </a:p>
         </p:txBody>
       </p:sp>
     </p:spTree>
     <p:extLst>
       <p:ext uri="{BB962C8B-B14F-4D97-AF65-F5344CB8AC3E}">
-        <p14:creationId xmlns:p14="http://schemas.microsoft.com/office/powerpoint/2010/main" val="868906285"/>
+        <p14:creationId xmlns:p14="http://schemas.microsoft.com/office/powerpoint/2010/main" val="1189886503"/>
       </p:ext>
     </p:extLst>
   </p:cSld>
@@ -4511,7 +5522,7 @@
           <p:cNvPr id="2" name="Title 1">
             <a:extLst>
               <a:ext uri="{FF2B5EF4-FFF2-40B4-BE49-F238E27FC236}">
-                <a16:creationId xmlns:a16="http://schemas.microsoft.com/office/drawing/2014/main" id="{A8D790CB-E89A-4768-9057-68237A0154D6}"/>
+                <a16:creationId xmlns:a16="http://schemas.microsoft.com/office/drawing/2014/main" id="{F63B978F-140D-4FF4-99C4-59531F4C9D83}"/>
               </a:ext>
             </a:extLst>
           </p:cNvPr>
@@ -4528,43 +5539,47 @@
           <a:lstStyle/>
           <a:p>
             <a:r>
+              <a:rPr lang="en-US" altLang="ko-KR" dirty="0"/>
+              <a:t>Features to implement</a:t>
+            </a:r>
+            <a:endParaRPr lang="ko-KR" altLang="en-US" dirty="0"/>
+          </a:p>
+        </p:txBody>
+      </p:sp>
+      <p:sp>
+        <p:nvSpPr>
+          <p:cNvPr id="3" name="Content Placeholder 2">
+            <a:extLst>
+              <a:ext uri="{FF2B5EF4-FFF2-40B4-BE49-F238E27FC236}">
+                <a16:creationId xmlns:a16="http://schemas.microsoft.com/office/drawing/2014/main" id="{C3973C6C-AC8F-4052-B0C6-6699275C2A0E}"/>
+              </a:ext>
+            </a:extLst>
+          </p:cNvPr>
+          <p:cNvSpPr>
+            <a:spLocks noGrp="1"/>
+          </p:cNvSpPr>
+          <p:nvPr>
+            <p:ph idx="1"/>
+          </p:nvPr>
+        </p:nvSpPr>
+        <p:spPr/>
+        <p:txBody>
+          <a:bodyPr>
+            <a:normAutofit fontScale="92500" lnSpcReduction="20000"/>
+          </a:bodyPr>
+          <a:lstStyle/>
+          <a:p>
+            <a:r>
+              <a:rPr lang="en-US" altLang="ko-KR" dirty="0"/>
+              <a:t>Input : ‘</a:t>
+            </a:r>
+            <a:r>
               <a:rPr lang="en-US" altLang="ko-KR" dirty="0" err="1"/>
-              <a:t>Todo</a:t>
-            </a:r>
-            <a:endParaRPr lang="ko-KR" altLang="en-US" dirty="0"/>
-          </a:p>
-        </p:txBody>
-      </p:sp>
-      <p:sp>
-        <p:nvSpPr>
-          <p:cNvPr id="3" name="Content Placeholder 2">
-            <a:extLst>
-              <a:ext uri="{FF2B5EF4-FFF2-40B4-BE49-F238E27FC236}">
-                <a16:creationId xmlns:a16="http://schemas.microsoft.com/office/drawing/2014/main" id="{EB356E25-D6C1-4BC6-AF9D-6A9F337F383F}"/>
-              </a:ext>
-            </a:extLst>
-          </p:cNvPr>
-          <p:cNvSpPr>
-            <a:spLocks noGrp="1"/>
-          </p:cNvSpPr>
-          <p:nvPr>
-            <p:ph idx="1"/>
-          </p:nvPr>
-        </p:nvSpPr>
-        <p:spPr/>
-        <p:txBody>
-          <a:bodyPr>
-            <a:normAutofit lnSpcReduction="10000"/>
-          </a:bodyPr>
-          <a:lstStyle/>
-          <a:p>
-            <a:r>
-              <a:rPr lang="en-US" altLang="ko-KR" dirty="0" err="1"/>
-              <a:t>Practise</a:t>
+              <a:t>sudo</a:t>
             </a:r>
             <a:r>
               <a:rPr lang="en-US" altLang="ko-KR" dirty="0"/>
-              <a:t> Rust(MVP : File I/O)</a:t>
+              <a:t>’ markdown file</a:t>
             </a:r>
           </a:p>
           <a:p>
@@ -4572,20 +5587,17 @@
           </a:p>
           <a:p>
             <a:r>
-              <a:rPr lang="en-US" altLang="ko-KR" dirty="0" err="1"/>
-              <a:t>Analyse</a:t>
-            </a:r>
-            <a:r>
               <a:rPr lang="en-US" altLang="ko-KR" dirty="0"/>
-              <a:t> .</a:t>
-            </a:r>
-            <a:r>
-              <a:rPr lang="en-US" altLang="ko-KR" dirty="0" err="1"/>
-              <a:t>toml</a:t>
-            </a:r>
+              <a:t>Output : markdown file that can be consumed by certain SSG</a:t>
+            </a:r>
+          </a:p>
+          <a:p>
+            <a:endParaRPr lang="en-US" altLang="ko-KR" dirty="0"/>
+          </a:p>
+          <a:p>
             <a:r>
               <a:rPr lang="en-US" altLang="ko-KR" dirty="0"/>
-              <a:t> structure</a:t>
+              <a:t>Generate different front-matter and content syntax depending on which SSG is used</a:t>
             </a:r>
           </a:p>
           <a:p>
@@ -4594,7 +5606,7 @@
           <a:p>
             <a:r>
               <a:rPr lang="en-US" altLang="ko-KR" dirty="0"/>
-              <a:t>Set features to implement</a:t>
+              <a:t>Get external code snippet file from directory and display the content(use built-in syntax highlighting) with executed result</a:t>
             </a:r>
           </a:p>
           <a:p>
@@ -4603,24 +5615,7 @@
           <a:p>
             <a:r>
               <a:rPr lang="en-US" altLang="ko-KR" dirty="0"/>
-              <a:t>Research about Travis</a:t>
-            </a:r>
-          </a:p>
-          <a:p>
-            <a:endParaRPr lang="en-US" altLang="ko-KR" dirty="0"/>
-          </a:p>
-          <a:p>
-            <a:r>
-              <a:rPr lang="en-US" altLang="ko-KR" dirty="0"/>
-              <a:t>Design </a:t>
-            </a:r>
-            <a:r>
-              <a:rPr lang="en-US" altLang="ko-KR"/>
-              <a:t>and confirm </a:t>
-            </a:r>
-            <a:r>
-              <a:rPr lang="en-US" altLang="ko-KR" dirty="0"/>
-              <a:t>build process</a:t>
+              <a:t>Get and display elapsed time to build articles</a:t>
             </a:r>
           </a:p>
         </p:txBody>
@@ -4628,7 +5623,7 @@
     </p:spTree>
     <p:extLst>
       <p:ext uri="{BB962C8B-B14F-4D97-AF65-F5344CB8AC3E}">
-        <p14:creationId xmlns:p14="http://schemas.microsoft.com/office/powerpoint/2010/main" val="1189886503"/>
+        <p14:creationId xmlns:p14="http://schemas.microsoft.com/office/powerpoint/2010/main" val="2144320976"/>
       </p:ext>
     </p:extLst>
   </p:cSld>
@@ -4660,7 +5655,7 @@
           <p:cNvPr id="2" name="Title 1">
             <a:extLst>
               <a:ext uri="{FF2B5EF4-FFF2-40B4-BE49-F238E27FC236}">
-                <a16:creationId xmlns:a16="http://schemas.microsoft.com/office/drawing/2014/main" id="{F63B978F-140D-4FF4-99C4-59531F4C9D83}"/>
+                <a16:creationId xmlns:a16="http://schemas.microsoft.com/office/drawing/2014/main" id="{893E36EE-3C3B-4D62-A2CD-DD1B450BD26F}"/>
               </a:ext>
             </a:extLst>
           </p:cNvPr>
@@ -4678,7 +5673,7 @@
           <a:p>
             <a:r>
               <a:rPr lang="en-US" altLang="ko-KR" dirty="0"/>
-              <a:t>Features to implement</a:t>
+              <a:t>Markdown Structure</a:t>
             </a:r>
             <a:endParaRPr lang="ko-KR" altLang="en-US" dirty="0"/>
           </a:p>
@@ -4689,7 +5684,7 @@
           <p:cNvPr id="3" name="Content Placeholder 2">
             <a:extLst>
               <a:ext uri="{FF2B5EF4-FFF2-40B4-BE49-F238E27FC236}">
-                <a16:creationId xmlns:a16="http://schemas.microsoft.com/office/drawing/2014/main" id="{C3973C6C-AC8F-4052-B0C6-6699275C2A0E}"/>
+                <a16:creationId xmlns:a16="http://schemas.microsoft.com/office/drawing/2014/main" id="{57A83FD4-7A95-4CC3-B8B0-75DA930350AA}"/>
               </a:ext>
             </a:extLst>
           </p:cNvPr>
@@ -4707,25 +5702,42 @@
           <a:p>
             <a:r>
               <a:rPr lang="en-US" altLang="ko-KR" dirty="0"/>
-              <a:t>Get external code snippet file from directory and display the content(use built-in syntax highlighting) with </a:t>
-            </a:r>
-            <a:r>
-              <a:rPr lang="en-US" altLang="ko-KR"/>
-              <a:t>execute result</a:t>
-            </a:r>
-          </a:p>
-          <a:p>
-            <a:endParaRPr lang="en-US" altLang="ko-KR"/>
+              <a:t>Front-matter / Content</a:t>
+            </a:r>
           </a:p>
           <a:p>
             <a:endParaRPr lang="en-US" altLang="ko-KR" dirty="0"/>
+          </a:p>
+          <a:p>
+            <a:r>
+              <a:rPr lang="en-US" altLang="ko-KR" dirty="0"/>
+              <a:t>SSG deals with front-matter, focus on content</a:t>
+            </a:r>
+          </a:p>
+          <a:p>
+            <a:endParaRPr lang="en-US" altLang="ko-KR" dirty="0"/>
+          </a:p>
+          <a:p>
+            <a:r>
+              <a:rPr lang="en-US" altLang="ko-KR" dirty="0"/>
+              <a:t>#, =, -, *, _, &gt;, +, ! are already used</a:t>
+            </a:r>
+          </a:p>
+          <a:p>
+            <a:endParaRPr lang="en-US" altLang="ko-KR" dirty="0"/>
+          </a:p>
+          <a:p>
+            <a:r>
+              <a:rPr lang="en-US" altLang="ko-KR" dirty="0"/>
+              <a:t>Need to use some other mark to make commands($ or %)</a:t>
+            </a:r>
           </a:p>
         </p:txBody>
       </p:sp>
     </p:spTree>
     <p:extLst>
       <p:ext uri="{BB962C8B-B14F-4D97-AF65-F5344CB8AC3E}">
-        <p14:creationId xmlns:p14="http://schemas.microsoft.com/office/powerpoint/2010/main" val="2144320976"/>
+        <p14:creationId xmlns:p14="http://schemas.microsoft.com/office/powerpoint/2010/main" val="1020832055"/>
       </p:ext>
     </p:extLst>
   </p:cSld>

</xml_diff>

<commit_message>
Changed README, added read_file function
</commit_message>
<xml_diff>
--- a/layout.pptx
+++ b/layout.pptx
@@ -14,8 +14,7 @@
     <p:sldId id="264" r:id="rId8"/>
     <p:sldId id="261" r:id="rId9"/>
     <p:sldId id="265" r:id="rId10"/>
-    <p:sldId id="262" r:id="rId11"/>
-    <p:sldId id="266" r:id="rId12"/>
+    <p:sldId id="266" r:id="rId11"/>
   </p:sldIdLst>
   <p:sldSz cx="12192000" cy="6858000"/>
   <p:notesSz cx="6858000" cy="9144000"/>
@@ -271,7 +270,7 @@
           <a:p>
             <a:fld id="{3916EF0B-21FF-479F-8051-9F9DC1DC802A}" type="datetimeFigureOut">
               <a:rPr lang="ko-KR" altLang="en-US" smtClean="0"/>
-              <a:t>2019-06-19</a:t>
+              <a:t>2019-06-20</a:t>
             </a:fld>
             <a:endParaRPr lang="ko-KR" altLang="en-US"/>
           </a:p>
@@ -471,7 +470,7 @@
           <a:p>
             <a:fld id="{3916EF0B-21FF-479F-8051-9F9DC1DC802A}" type="datetimeFigureOut">
               <a:rPr lang="ko-KR" altLang="en-US" smtClean="0"/>
-              <a:t>2019-06-19</a:t>
+              <a:t>2019-06-20</a:t>
             </a:fld>
             <a:endParaRPr lang="ko-KR" altLang="en-US"/>
           </a:p>
@@ -681,7 +680,7 @@
           <a:p>
             <a:fld id="{3916EF0B-21FF-479F-8051-9F9DC1DC802A}" type="datetimeFigureOut">
               <a:rPr lang="ko-KR" altLang="en-US" smtClean="0"/>
-              <a:t>2019-06-19</a:t>
+              <a:t>2019-06-20</a:t>
             </a:fld>
             <a:endParaRPr lang="ko-KR" altLang="en-US"/>
           </a:p>
@@ -881,7 +880,7 @@
           <a:p>
             <a:fld id="{3916EF0B-21FF-479F-8051-9F9DC1DC802A}" type="datetimeFigureOut">
               <a:rPr lang="ko-KR" altLang="en-US" smtClean="0"/>
-              <a:t>2019-06-19</a:t>
+              <a:t>2019-06-20</a:t>
             </a:fld>
             <a:endParaRPr lang="ko-KR" altLang="en-US"/>
           </a:p>
@@ -1157,7 +1156,7 @@
           <a:p>
             <a:fld id="{3916EF0B-21FF-479F-8051-9F9DC1DC802A}" type="datetimeFigureOut">
               <a:rPr lang="ko-KR" altLang="en-US" smtClean="0"/>
-              <a:t>2019-06-19</a:t>
+              <a:t>2019-06-20</a:t>
             </a:fld>
             <a:endParaRPr lang="ko-KR" altLang="en-US"/>
           </a:p>
@@ -1425,7 +1424,7 @@
           <a:p>
             <a:fld id="{3916EF0B-21FF-479F-8051-9F9DC1DC802A}" type="datetimeFigureOut">
               <a:rPr lang="ko-KR" altLang="en-US" smtClean="0"/>
-              <a:t>2019-06-19</a:t>
+              <a:t>2019-06-20</a:t>
             </a:fld>
             <a:endParaRPr lang="ko-KR" altLang="en-US"/>
           </a:p>
@@ -1840,7 +1839,7 @@
           <a:p>
             <a:fld id="{3916EF0B-21FF-479F-8051-9F9DC1DC802A}" type="datetimeFigureOut">
               <a:rPr lang="ko-KR" altLang="en-US" smtClean="0"/>
-              <a:t>2019-06-19</a:t>
+              <a:t>2019-06-20</a:t>
             </a:fld>
             <a:endParaRPr lang="ko-KR" altLang="en-US"/>
           </a:p>
@@ -1982,7 +1981,7 @@
           <a:p>
             <a:fld id="{3916EF0B-21FF-479F-8051-9F9DC1DC802A}" type="datetimeFigureOut">
               <a:rPr lang="ko-KR" altLang="en-US" smtClean="0"/>
-              <a:t>2019-06-19</a:t>
+              <a:t>2019-06-20</a:t>
             </a:fld>
             <a:endParaRPr lang="ko-KR" altLang="en-US"/>
           </a:p>
@@ -2095,7 +2094,7 @@
           <a:p>
             <a:fld id="{3916EF0B-21FF-479F-8051-9F9DC1DC802A}" type="datetimeFigureOut">
               <a:rPr lang="ko-KR" altLang="en-US" smtClean="0"/>
-              <a:t>2019-06-19</a:t>
+              <a:t>2019-06-20</a:t>
             </a:fld>
             <a:endParaRPr lang="ko-KR" altLang="en-US"/>
           </a:p>
@@ -2408,7 +2407,7 @@
           <a:p>
             <a:fld id="{3916EF0B-21FF-479F-8051-9F9DC1DC802A}" type="datetimeFigureOut">
               <a:rPr lang="ko-KR" altLang="en-US" smtClean="0"/>
-              <a:t>2019-06-19</a:t>
+              <a:t>2019-06-20</a:t>
             </a:fld>
             <a:endParaRPr lang="ko-KR" altLang="en-US"/>
           </a:p>
@@ -2697,7 +2696,7 @@
           <a:p>
             <a:fld id="{3916EF0B-21FF-479F-8051-9F9DC1DC802A}" type="datetimeFigureOut">
               <a:rPr lang="ko-KR" altLang="en-US" smtClean="0"/>
-              <a:t>2019-06-19</a:t>
+              <a:t>2019-06-20</a:t>
             </a:fld>
             <a:endParaRPr lang="ko-KR" altLang="en-US"/>
           </a:p>
@@ -2940,7 +2939,7 @@
           <a:p>
             <a:fld id="{3916EF0B-21FF-479F-8051-9F9DC1DC802A}" type="datetimeFigureOut">
               <a:rPr lang="ko-KR" altLang="en-US" smtClean="0"/>
-              <a:t>2019-06-19</a:t>
+              <a:t>2019-06-20</a:t>
             </a:fld>
             <a:endParaRPr lang="ko-KR" altLang="en-US"/>
           </a:p>
@@ -3454,124 +3453,6 @@
           <p:cNvPr id="2" name="Title 1">
             <a:extLst>
               <a:ext uri="{FF2B5EF4-FFF2-40B4-BE49-F238E27FC236}">
-                <a16:creationId xmlns:a16="http://schemas.microsoft.com/office/drawing/2014/main" id="{5CD19CA1-C696-4142-8CD2-BDEE6C1D97A9}"/>
-              </a:ext>
-            </a:extLst>
-          </p:cNvPr>
-          <p:cNvSpPr>
-            <a:spLocks noGrp="1"/>
-          </p:cNvSpPr>
-          <p:nvPr>
-            <p:ph type="title"/>
-          </p:nvPr>
-        </p:nvSpPr>
-        <p:spPr/>
-        <p:txBody>
-          <a:bodyPr/>
-          <a:lstStyle/>
-          <a:p>
-            <a:r>
-              <a:rPr lang="en-US" altLang="ko-KR" dirty="0"/>
-              <a:t>Process</a:t>
-            </a:r>
-            <a:endParaRPr lang="ko-KR" altLang="en-US" dirty="0"/>
-          </a:p>
-        </p:txBody>
-      </p:sp>
-      <p:sp>
-        <p:nvSpPr>
-          <p:cNvPr id="3" name="Content Placeholder 2">
-            <a:extLst>
-              <a:ext uri="{FF2B5EF4-FFF2-40B4-BE49-F238E27FC236}">
-                <a16:creationId xmlns:a16="http://schemas.microsoft.com/office/drawing/2014/main" id="{7E22FF0F-951B-4188-945C-F10EA5B55F31}"/>
-              </a:ext>
-            </a:extLst>
-          </p:cNvPr>
-          <p:cNvSpPr>
-            <a:spLocks noGrp="1"/>
-          </p:cNvSpPr>
-          <p:nvPr>
-            <p:ph idx="1"/>
-          </p:nvPr>
-        </p:nvSpPr>
-        <p:spPr/>
-        <p:txBody>
-          <a:bodyPr/>
-          <a:lstStyle/>
-          <a:p>
-            <a:r>
-              <a:rPr lang="en-US" altLang="ko-KR" dirty="0" err="1"/>
-              <a:t>Lexer</a:t>
-            </a:r>
-            <a:r>
-              <a:rPr lang="en-US" altLang="ko-KR" dirty="0"/>
-              <a:t> – Reads input(.</a:t>
-            </a:r>
-            <a:r>
-              <a:rPr lang="en-US" altLang="ko-KR" dirty="0" err="1"/>
-              <a:t>mdown</a:t>
-            </a:r>
-            <a:r>
-              <a:rPr lang="en-US" altLang="ko-KR" dirty="0"/>
-              <a:t>) and convert the text into tokens</a:t>
-            </a:r>
-          </a:p>
-          <a:p>
-            <a:endParaRPr lang="en-US" altLang="ko-KR" dirty="0"/>
-          </a:p>
-          <a:p>
-            <a:r>
-              <a:rPr lang="en-US" altLang="ko-KR" dirty="0"/>
-              <a:t>Generator – Writes output made with tokens(.md) which can be processed with SSG</a:t>
-            </a:r>
-          </a:p>
-          <a:p>
-            <a:endParaRPr lang="en-US" altLang="ko-KR" dirty="0"/>
-          </a:p>
-          <a:p>
-            <a:r>
-              <a:rPr lang="en-US" altLang="ko-KR" dirty="0"/>
-              <a:t>Note that parser is not needed since the input/output text is markup language, which doesn’t need to be an AST</a:t>
-            </a:r>
-            <a:endParaRPr lang="ko-KR" altLang="en-US" dirty="0"/>
-          </a:p>
-        </p:txBody>
-      </p:sp>
-    </p:spTree>
-    <p:extLst>
-      <p:ext uri="{BB962C8B-B14F-4D97-AF65-F5344CB8AC3E}">
-        <p14:creationId xmlns:p14="http://schemas.microsoft.com/office/powerpoint/2010/main" val="21262782"/>
-      </p:ext>
-    </p:extLst>
-  </p:cSld>
-  <p:clrMapOvr>
-    <a:masterClrMapping/>
-  </p:clrMapOvr>
-</p:sld>
-</file>
-
-<file path=ppt/slides/slide11.xml><?xml version="1.0" encoding="utf-8"?>
-<p:sld xmlns:a="http://schemas.openxmlformats.org/drawingml/2006/main" xmlns:r="http://schemas.openxmlformats.org/officeDocument/2006/relationships" xmlns:p="http://schemas.openxmlformats.org/presentationml/2006/main">
-  <p:cSld>
-    <p:spTree>
-      <p:nvGrpSpPr>
-        <p:cNvPr id="1" name=""/>
-        <p:cNvGrpSpPr/>
-        <p:nvPr/>
-      </p:nvGrpSpPr>
-      <p:grpSpPr>
-        <a:xfrm>
-          <a:off x="0" y="0"/>
-          <a:ext cx="0" cy="0"/>
-          <a:chOff x="0" y="0"/>
-          <a:chExt cx="0" cy="0"/>
-        </a:xfrm>
-      </p:grpSpPr>
-      <p:sp>
-        <p:nvSpPr>
-          <p:cNvPr id="2" name="Title 1">
-            <a:extLst>
-              <a:ext uri="{FF2B5EF4-FFF2-40B4-BE49-F238E27FC236}">
                 <a16:creationId xmlns:a16="http://schemas.microsoft.com/office/drawing/2014/main" id="{0AA12D00-4D4E-4365-A10D-30A5745394D1}"/>
               </a:ext>
             </a:extLst>

</xml_diff>

<commit_message>
Not important, just tweaking
</commit_message>
<xml_diff>
--- a/layout.pptx
+++ b/layout.pptx
@@ -13,8 +13,9 @@
     <p:sldId id="263" r:id="rId7"/>
     <p:sldId id="264" r:id="rId8"/>
     <p:sldId id="261" r:id="rId9"/>
-    <p:sldId id="265" r:id="rId10"/>
-    <p:sldId id="266" r:id="rId11"/>
+    <p:sldId id="267" r:id="rId10"/>
+    <p:sldId id="265" r:id="rId11"/>
+    <p:sldId id="266" r:id="rId12"/>
   </p:sldIdLst>
   <p:sldSz cx="12192000" cy="6858000"/>
   <p:notesSz cx="6858000" cy="9144000"/>
@@ -270,7 +271,7 @@
           <a:p>
             <a:fld id="{3916EF0B-21FF-479F-8051-9F9DC1DC802A}" type="datetimeFigureOut">
               <a:rPr lang="ko-KR" altLang="en-US" smtClean="0"/>
-              <a:t>2019-06-20</a:t>
+              <a:t>2019-06-26</a:t>
             </a:fld>
             <a:endParaRPr lang="ko-KR" altLang="en-US"/>
           </a:p>
@@ -470,7 +471,7 @@
           <a:p>
             <a:fld id="{3916EF0B-21FF-479F-8051-9F9DC1DC802A}" type="datetimeFigureOut">
               <a:rPr lang="ko-KR" altLang="en-US" smtClean="0"/>
-              <a:t>2019-06-20</a:t>
+              <a:t>2019-06-26</a:t>
             </a:fld>
             <a:endParaRPr lang="ko-KR" altLang="en-US"/>
           </a:p>
@@ -680,7 +681,7 @@
           <a:p>
             <a:fld id="{3916EF0B-21FF-479F-8051-9F9DC1DC802A}" type="datetimeFigureOut">
               <a:rPr lang="ko-KR" altLang="en-US" smtClean="0"/>
-              <a:t>2019-06-20</a:t>
+              <a:t>2019-06-26</a:t>
             </a:fld>
             <a:endParaRPr lang="ko-KR" altLang="en-US"/>
           </a:p>
@@ -880,7 +881,7 @@
           <a:p>
             <a:fld id="{3916EF0B-21FF-479F-8051-9F9DC1DC802A}" type="datetimeFigureOut">
               <a:rPr lang="ko-KR" altLang="en-US" smtClean="0"/>
-              <a:t>2019-06-20</a:t>
+              <a:t>2019-06-26</a:t>
             </a:fld>
             <a:endParaRPr lang="ko-KR" altLang="en-US"/>
           </a:p>
@@ -1156,7 +1157,7 @@
           <a:p>
             <a:fld id="{3916EF0B-21FF-479F-8051-9F9DC1DC802A}" type="datetimeFigureOut">
               <a:rPr lang="ko-KR" altLang="en-US" smtClean="0"/>
-              <a:t>2019-06-20</a:t>
+              <a:t>2019-06-26</a:t>
             </a:fld>
             <a:endParaRPr lang="ko-KR" altLang="en-US"/>
           </a:p>
@@ -1424,7 +1425,7 @@
           <a:p>
             <a:fld id="{3916EF0B-21FF-479F-8051-9F9DC1DC802A}" type="datetimeFigureOut">
               <a:rPr lang="ko-KR" altLang="en-US" smtClean="0"/>
-              <a:t>2019-06-20</a:t>
+              <a:t>2019-06-26</a:t>
             </a:fld>
             <a:endParaRPr lang="ko-KR" altLang="en-US"/>
           </a:p>
@@ -1839,7 +1840,7 @@
           <a:p>
             <a:fld id="{3916EF0B-21FF-479F-8051-9F9DC1DC802A}" type="datetimeFigureOut">
               <a:rPr lang="ko-KR" altLang="en-US" smtClean="0"/>
-              <a:t>2019-06-20</a:t>
+              <a:t>2019-06-26</a:t>
             </a:fld>
             <a:endParaRPr lang="ko-KR" altLang="en-US"/>
           </a:p>
@@ -1981,7 +1982,7 @@
           <a:p>
             <a:fld id="{3916EF0B-21FF-479F-8051-9F9DC1DC802A}" type="datetimeFigureOut">
               <a:rPr lang="ko-KR" altLang="en-US" smtClean="0"/>
-              <a:t>2019-06-20</a:t>
+              <a:t>2019-06-26</a:t>
             </a:fld>
             <a:endParaRPr lang="ko-KR" altLang="en-US"/>
           </a:p>
@@ -2094,7 +2095,7 @@
           <a:p>
             <a:fld id="{3916EF0B-21FF-479F-8051-9F9DC1DC802A}" type="datetimeFigureOut">
               <a:rPr lang="ko-KR" altLang="en-US" smtClean="0"/>
-              <a:t>2019-06-20</a:t>
+              <a:t>2019-06-26</a:t>
             </a:fld>
             <a:endParaRPr lang="ko-KR" altLang="en-US"/>
           </a:p>
@@ -2407,7 +2408,7 @@
           <a:p>
             <a:fld id="{3916EF0B-21FF-479F-8051-9F9DC1DC802A}" type="datetimeFigureOut">
               <a:rPr lang="ko-KR" altLang="en-US" smtClean="0"/>
-              <a:t>2019-06-20</a:t>
+              <a:t>2019-06-26</a:t>
             </a:fld>
             <a:endParaRPr lang="ko-KR" altLang="en-US"/>
           </a:p>
@@ -2696,7 +2697,7 @@
           <a:p>
             <a:fld id="{3916EF0B-21FF-479F-8051-9F9DC1DC802A}" type="datetimeFigureOut">
               <a:rPr lang="ko-KR" altLang="en-US" smtClean="0"/>
-              <a:t>2019-06-20</a:t>
+              <a:t>2019-06-26</a:t>
             </a:fld>
             <a:endParaRPr lang="ko-KR" altLang="en-US"/>
           </a:p>
@@ -2939,7 +2940,7 @@
           <a:p>
             <a:fld id="{3916EF0B-21FF-479F-8051-9F9DC1DC802A}" type="datetimeFigureOut">
               <a:rPr lang="ko-KR" altLang="en-US" smtClean="0"/>
-              <a:t>2019-06-20</a:t>
+              <a:t>2019-06-26</a:t>
             </a:fld>
             <a:endParaRPr lang="ko-KR" altLang="en-US"/>
           </a:p>
@@ -3453,6 +3454,120 @@
           <p:cNvPr id="2" name="Title 1">
             <a:extLst>
               <a:ext uri="{FF2B5EF4-FFF2-40B4-BE49-F238E27FC236}">
+                <a16:creationId xmlns:a16="http://schemas.microsoft.com/office/drawing/2014/main" id="{893E36EE-3C3B-4D62-A2CD-DD1B450BD26F}"/>
+              </a:ext>
+            </a:extLst>
+          </p:cNvPr>
+          <p:cNvSpPr>
+            <a:spLocks noGrp="1"/>
+          </p:cNvSpPr>
+          <p:nvPr>
+            <p:ph type="title"/>
+          </p:nvPr>
+        </p:nvSpPr>
+        <p:spPr/>
+        <p:txBody>
+          <a:bodyPr/>
+          <a:lstStyle/>
+          <a:p>
+            <a:r>
+              <a:rPr lang="en-US" altLang="ko-KR" dirty="0"/>
+              <a:t>Markdown Structure</a:t>
+            </a:r>
+            <a:endParaRPr lang="ko-KR" altLang="en-US" dirty="0"/>
+          </a:p>
+        </p:txBody>
+      </p:sp>
+      <p:sp>
+        <p:nvSpPr>
+          <p:cNvPr id="3" name="Content Placeholder 2">
+            <a:extLst>
+              <a:ext uri="{FF2B5EF4-FFF2-40B4-BE49-F238E27FC236}">
+                <a16:creationId xmlns:a16="http://schemas.microsoft.com/office/drawing/2014/main" id="{57A83FD4-7A95-4CC3-B8B0-75DA930350AA}"/>
+              </a:ext>
+            </a:extLst>
+          </p:cNvPr>
+          <p:cNvSpPr>
+            <a:spLocks noGrp="1"/>
+          </p:cNvSpPr>
+          <p:nvPr>
+            <p:ph idx="1"/>
+          </p:nvPr>
+        </p:nvSpPr>
+        <p:spPr/>
+        <p:txBody>
+          <a:bodyPr/>
+          <a:lstStyle/>
+          <a:p>
+            <a:r>
+              <a:rPr lang="en-US" altLang="ko-KR" dirty="0"/>
+              <a:t>Front-matter / Content</a:t>
+            </a:r>
+          </a:p>
+          <a:p>
+            <a:endParaRPr lang="en-US" altLang="ko-KR" dirty="0"/>
+          </a:p>
+          <a:p>
+            <a:r>
+              <a:rPr lang="en-US" altLang="ko-KR" dirty="0"/>
+              <a:t>SSG deals with front-matter, focus on content</a:t>
+            </a:r>
+          </a:p>
+          <a:p>
+            <a:endParaRPr lang="en-US" altLang="ko-KR" dirty="0"/>
+          </a:p>
+          <a:p>
+            <a:r>
+              <a:rPr lang="en-US" altLang="ko-KR" dirty="0"/>
+              <a:t>#, =, -, *, _, &gt;, +, ! are already used</a:t>
+            </a:r>
+          </a:p>
+          <a:p>
+            <a:endParaRPr lang="en-US" altLang="ko-KR" dirty="0"/>
+          </a:p>
+          <a:p>
+            <a:r>
+              <a:rPr lang="en-US" altLang="ko-KR" dirty="0"/>
+              <a:t>Need to use some other mark to make commands($ or %)</a:t>
+            </a:r>
+          </a:p>
+        </p:txBody>
+      </p:sp>
+    </p:spTree>
+    <p:extLst>
+      <p:ext uri="{BB962C8B-B14F-4D97-AF65-F5344CB8AC3E}">
+        <p14:creationId xmlns:p14="http://schemas.microsoft.com/office/powerpoint/2010/main" val="1020832055"/>
+      </p:ext>
+    </p:extLst>
+  </p:cSld>
+  <p:clrMapOvr>
+    <a:masterClrMapping/>
+  </p:clrMapOvr>
+</p:sld>
+</file>
+
+<file path=ppt/slides/slide11.xml><?xml version="1.0" encoding="utf-8"?>
+<p:sld xmlns:a="http://schemas.openxmlformats.org/drawingml/2006/main" xmlns:r="http://schemas.openxmlformats.org/officeDocument/2006/relationships" xmlns:p="http://schemas.openxmlformats.org/presentationml/2006/main">
+  <p:cSld>
+    <p:spTree>
+      <p:nvGrpSpPr>
+        <p:cNvPr id="1" name=""/>
+        <p:cNvGrpSpPr/>
+        <p:nvPr/>
+      </p:nvGrpSpPr>
+      <p:grpSpPr>
+        <a:xfrm>
+          <a:off x="0" y="0"/>
+          <a:ext cx="0" cy="0"/>
+          <a:chOff x="0" y="0"/>
+          <a:chExt cx="0" cy="0"/>
+        </a:xfrm>
+      </p:grpSpPr>
+      <p:sp>
+        <p:nvSpPr>
+          <p:cNvPr id="2" name="Title 1">
+            <a:extLst>
+              <a:ext uri="{FF2B5EF4-FFF2-40B4-BE49-F238E27FC236}">
                 <a16:creationId xmlns:a16="http://schemas.microsoft.com/office/drawing/2014/main" id="{0AA12D00-4D4E-4365-A10D-30A5745394D1}"/>
               </a:ext>
             </a:extLst>
@@ -3648,156 +3763,70 @@
           </a:fontRef>
         </p:style>
       </p:cxnSp>
-      <p:grpSp>
-        <p:nvGrpSpPr>
-          <p:cNvPr id="55" name="Group 54">
-            <a:extLst>
-              <a:ext uri="{FF2B5EF4-FFF2-40B4-BE49-F238E27FC236}">
-                <a16:creationId xmlns:a16="http://schemas.microsoft.com/office/drawing/2014/main" id="{E897FF2B-D812-4661-84F4-B7D9DD58066A}"/>
-              </a:ext>
-            </a:extLst>
-          </p:cNvPr>
-          <p:cNvGrpSpPr/>
+      <p:sp>
+        <p:nvSpPr>
+          <p:cNvPr id="4" name="Rectangle 3">
+            <a:extLst>
+              <a:ext uri="{FF2B5EF4-FFF2-40B4-BE49-F238E27FC236}">
+                <a16:creationId xmlns:a16="http://schemas.microsoft.com/office/drawing/2014/main" id="{1DAA323B-783E-4AFC-B883-62186D3AC04C}"/>
+              </a:ext>
+            </a:extLst>
+          </p:cNvPr>
+          <p:cNvSpPr/>
           <p:nvPr/>
-        </p:nvGrpSpPr>
-        <p:grpSpPr>
+        </p:nvSpPr>
+        <p:spPr>
           <a:xfrm>
-            <a:off x="838200" y="1690688"/>
-            <a:ext cx="2207004" cy="1304640"/>
-            <a:chOff x="1464927" y="2290194"/>
-            <a:chExt cx="2207004" cy="1304640"/>
+            <a:off x="838200" y="1862814"/>
+            <a:ext cx="2014057" cy="1132514"/>
           </a:xfrm>
-        </p:grpSpPr>
-        <p:sp>
-          <p:nvSpPr>
-            <p:cNvPr id="4" name="Rectangle 3">
-              <a:extLst>
-                <a:ext uri="{FF2B5EF4-FFF2-40B4-BE49-F238E27FC236}">
-                  <a16:creationId xmlns:a16="http://schemas.microsoft.com/office/drawing/2014/main" id="{1DAA323B-783E-4AFC-B883-62186D3AC04C}"/>
-                </a:ext>
-              </a:extLst>
-            </p:cNvPr>
-            <p:cNvSpPr/>
-            <p:nvPr/>
-          </p:nvSpPr>
-          <p:spPr>
-            <a:xfrm>
-              <a:off x="1464927" y="2462320"/>
-              <a:ext cx="2014057" cy="1132514"/>
-            </a:xfrm>
-            <a:prstGeom prst="rect">
-              <a:avLst/>
-            </a:prstGeom>
-            <a:noFill/>
-            <a:ln>
+          <a:prstGeom prst="rect">
+            <a:avLst/>
+          </a:prstGeom>
+          <a:noFill/>
+          <a:ln>
+            <a:solidFill>
+              <a:schemeClr val="tx1"/>
+            </a:solidFill>
+          </a:ln>
+        </p:spPr>
+        <p:style>
+          <a:lnRef idx="2">
+            <a:schemeClr val="accent1">
+              <a:shade val="50000"/>
+            </a:schemeClr>
+          </a:lnRef>
+          <a:fillRef idx="1">
+            <a:schemeClr val="accent1"/>
+          </a:fillRef>
+          <a:effectRef idx="0">
+            <a:schemeClr val="accent1"/>
+          </a:effectRef>
+          <a:fontRef idx="minor">
+            <a:schemeClr val="lt1"/>
+          </a:fontRef>
+        </p:style>
+        <p:txBody>
+          <a:bodyPr rtlCol="0" anchor="ctr"/>
+          <a:lstStyle/>
+          <a:p>
+            <a:pPr algn="ctr"/>
+            <a:r>
+              <a:rPr lang="en-US" altLang="ko-KR">
+                <a:solidFill>
+                  <a:schemeClr val="tx1"/>
+                </a:solidFill>
+              </a:rPr>
+              <a:t>Start</a:t>
+            </a:r>
+            <a:endParaRPr lang="ko-KR" altLang="en-US" dirty="0">
               <a:solidFill>
                 <a:schemeClr val="tx1"/>
               </a:solidFill>
-            </a:ln>
-          </p:spPr>
-          <p:style>
-            <a:lnRef idx="2">
-              <a:schemeClr val="accent1">
-                <a:shade val="50000"/>
-              </a:schemeClr>
-            </a:lnRef>
-            <a:fillRef idx="1">
-              <a:schemeClr val="accent1"/>
-            </a:fillRef>
-            <a:effectRef idx="0">
-              <a:schemeClr val="accent1"/>
-            </a:effectRef>
-            <a:fontRef idx="minor">
-              <a:schemeClr val="lt1"/>
-            </a:fontRef>
-          </p:style>
-          <p:txBody>
-            <a:bodyPr rtlCol="0" anchor="ctr"/>
-            <a:lstStyle/>
-            <a:p>
-              <a:pPr algn="ctr"/>
-              <a:r>
-                <a:rPr lang="en-US" altLang="ko-KR" dirty="0">
-                  <a:solidFill>
-                    <a:schemeClr val="tx1"/>
-                  </a:solidFill>
-                </a:rPr>
-                <a:t>Generate</a:t>
-              </a:r>
-            </a:p>
-            <a:p>
-              <a:pPr algn="ctr"/>
-              <a:r>
-                <a:rPr lang="en-US" altLang="ko-KR" dirty="0">
-                  <a:solidFill>
-                    <a:schemeClr val="tx1"/>
-                  </a:solidFill>
-                </a:rPr>
-                <a:t>front-matter</a:t>
-              </a:r>
-              <a:endParaRPr lang="ko-KR" altLang="en-US" dirty="0">
-                <a:solidFill>
-                  <a:schemeClr val="tx1"/>
-                </a:solidFill>
-              </a:endParaRPr>
-            </a:p>
-          </p:txBody>
-        </p:sp>
-        <p:sp>
-          <p:nvSpPr>
-            <p:cNvPr id="54" name="Star: 5 Points 53">
-              <a:extLst>
-                <a:ext uri="{FF2B5EF4-FFF2-40B4-BE49-F238E27FC236}">
-                  <a16:creationId xmlns:a16="http://schemas.microsoft.com/office/drawing/2014/main" id="{65448BDE-05B9-4112-B261-456D4C7E45C9}"/>
-                </a:ext>
-              </a:extLst>
-            </p:cNvPr>
-            <p:cNvSpPr/>
-            <p:nvPr/>
-          </p:nvSpPr>
-          <p:spPr>
-            <a:xfrm>
-              <a:off x="3286037" y="2290194"/>
-              <a:ext cx="385894" cy="385894"/>
-            </a:xfrm>
-            <a:prstGeom prst="star5">
-              <a:avLst/>
-            </a:prstGeom>
-            <a:solidFill>
-              <a:srgbClr val="FFFF00"/>
-            </a:solidFill>
-            <a:ln>
-              <a:solidFill>
-                <a:srgbClr val="FFFF00"/>
-              </a:solidFill>
-            </a:ln>
-          </p:spPr>
-          <p:style>
-            <a:lnRef idx="2">
-              <a:schemeClr val="accent1">
-                <a:shade val="50000"/>
-              </a:schemeClr>
-            </a:lnRef>
-            <a:fillRef idx="1">
-              <a:schemeClr val="accent1"/>
-            </a:fillRef>
-            <a:effectRef idx="0">
-              <a:schemeClr val="accent1"/>
-            </a:effectRef>
-            <a:fontRef idx="minor">
-              <a:schemeClr val="lt1"/>
-            </a:fontRef>
-          </p:style>
-          <p:txBody>
-            <a:bodyPr rtlCol="0" anchor="ctr"/>
-            <a:lstStyle/>
-            <a:p>
-              <a:pPr algn="ctr"/>
-              <a:endParaRPr lang="ko-KR" altLang="en-US"/>
-            </a:p>
-          </p:txBody>
-        </p:sp>
-      </p:grpSp>
+            </a:endParaRPr>
+          </a:p>
+        </p:txBody>
+      </p:sp>
       <p:sp>
         <p:nvSpPr>
           <p:cNvPr id="60" name="Flowchart: Decision 59">
@@ -3880,6 +3909,7 @@
             </a:extLst>
           </p:cNvPr>
           <p:cNvCxnSpPr>
+            <a:cxnSpLocks/>
             <a:stCxn id="4" idx="2"/>
             <a:endCxn id="60" idx="0"/>
           </p:cNvCxnSpPr>
@@ -5446,7 +5476,7 @@
         <p:spPr/>
         <p:txBody>
           <a:bodyPr>
-            <a:normAutofit fontScale="92500" lnSpcReduction="20000"/>
+            <a:normAutofit/>
           </a:bodyPr>
           <a:lstStyle/>
           <a:p>
@@ -5470,15 +5500,6 @@
             <a:r>
               <a:rPr lang="en-US" altLang="ko-KR" dirty="0"/>
               <a:t>Output : markdown file that can be consumed by certain SSG</a:t>
-            </a:r>
-          </a:p>
-          <a:p>
-            <a:endParaRPr lang="en-US" altLang="ko-KR" dirty="0"/>
-          </a:p>
-          <a:p>
-            <a:r>
-              <a:rPr lang="en-US" altLang="ko-KR" dirty="0"/>
-              <a:t>Generate different front-matter and content syntax depending on which SSG is used</a:t>
             </a:r>
           </a:p>
           <a:p>
@@ -5536,7 +5557,7 @@
           <p:cNvPr id="2" name="Title 1">
             <a:extLst>
               <a:ext uri="{FF2B5EF4-FFF2-40B4-BE49-F238E27FC236}">
-                <a16:creationId xmlns:a16="http://schemas.microsoft.com/office/drawing/2014/main" id="{893E36EE-3C3B-4D62-A2CD-DD1B450BD26F}"/>
+                <a16:creationId xmlns:a16="http://schemas.microsoft.com/office/drawing/2014/main" id="{1266B335-A155-4FF1-983C-1B8CF3E6A768}"/>
               </a:ext>
             </a:extLst>
           </p:cNvPr>
@@ -5554,7 +5575,7 @@
           <a:p>
             <a:r>
               <a:rPr lang="en-US" altLang="ko-KR" dirty="0"/>
-              <a:t>Markdown Structure</a:t>
+              <a:t>Features to implement “later”</a:t>
             </a:r>
             <a:endParaRPr lang="ko-KR" altLang="en-US" dirty="0"/>
           </a:p>
@@ -5565,7 +5586,7 @@
           <p:cNvPr id="3" name="Content Placeholder 2">
             <a:extLst>
               <a:ext uri="{FF2B5EF4-FFF2-40B4-BE49-F238E27FC236}">
-                <a16:creationId xmlns:a16="http://schemas.microsoft.com/office/drawing/2014/main" id="{57A83FD4-7A95-4CC3-B8B0-75DA930350AA}"/>
+                <a16:creationId xmlns:a16="http://schemas.microsoft.com/office/drawing/2014/main" id="{5FA37FAE-6AED-4FDC-87B5-8D7FDD6F0F80}"/>
               </a:ext>
             </a:extLst>
           </p:cNvPr>
@@ -5583,42 +5604,16 @@
           <a:p>
             <a:r>
               <a:rPr lang="en-US" altLang="ko-KR" dirty="0"/>
-              <a:t>Front-matter / Content</a:t>
-            </a:r>
-          </a:p>
-          <a:p>
-            <a:endParaRPr lang="en-US" altLang="ko-KR" dirty="0"/>
-          </a:p>
-          <a:p>
-            <a:r>
-              <a:rPr lang="en-US" altLang="ko-KR" dirty="0"/>
-              <a:t>SSG deals with front-matter, focus on content</a:t>
-            </a:r>
-          </a:p>
-          <a:p>
-            <a:endParaRPr lang="en-US" altLang="ko-KR" dirty="0"/>
-          </a:p>
-          <a:p>
-            <a:r>
-              <a:rPr lang="en-US" altLang="ko-KR" dirty="0"/>
-              <a:t>#, =, -, *, _, &gt;, +, ! are already used</a:t>
-            </a:r>
-          </a:p>
-          <a:p>
-            <a:endParaRPr lang="en-US" altLang="ko-KR" dirty="0"/>
-          </a:p>
-          <a:p>
-            <a:r>
-              <a:rPr lang="en-US" altLang="ko-KR" dirty="0"/>
-              <a:t>Need to use some other mark to make commands($ or %)</a:t>
-            </a:r>
+              <a:t>Generate front-matter depended on SSG</a:t>
+            </a:r>
+            <a:endParaRPr lang="ko-KR" altLang="en-US" dirty="0"/>
           </a:p>
         </p:txBody>
       </p:sp>
     </p:spTree>
     <p:extLst>
       <p:ext uri="{BB962C8B-B14F-4D97-AF65-F5344CB8AC3E}">
-        <p14:creationId xmlns:p14="http://schemas.microsoft.com/office/powerpoint/2010/main" val="1020832055"/>
+        <p14:creationId xmlns:p14="http://schemas.microsoft.com/office/powerpoint/2010/main" val="1298351479"/>
       </p:ext>
     </p:extLst>
   </p:cSld>

</xml_diff>

<commit_message>
data modelling, started working with content trait
</commit_message>
<xml_diff>
--- a/layout.pptx
+++ b/layout.pptx
@@ -13,10 +13,10 @@
     <p:sldId id="263" r:id="rId7"/>
     <p:sldId id="264" r:id="rId8"/>
     <p:sldId id="261" r:id="rId9"/>
-    <p:sldId id="267" r:id="rId10"/>
-    <p:sldId id="265" r:id="rId11"/>
-    <p:sldId id="268" r:id="rId12"/>
-    <p:sldId id="269" r:id="rId13"/>
+    <p:sldId id="265" r:id="rId10"/>
+    <p:sldId id="268" r:id="rId11"/>
+    <p:sldId id="269" r:id="rId12"/>
+    <p:sldId id="270" r:id="rId13"/>
     <p:sldId id="266" r:id="rId14"/>
   </p:sldIdLst>
   <p:sldSz cx="12192000" cy="6858000"/>
@@ -273,7 +273,7 @@
           <a:p>
             <a:fld id="{3916EF0B-21FF-479F-8051-9F9DC1DC802A}" type="datetimeFigureOut">
               <a:rPr lang="ko-KR" altLang="en-US" smtClean="0"/>
-              <a:t>2019-10-24</a:t>
+              <a:t>2019-10-26</a:t>
             </a:fld>
             <a:endParaRPr lang="ko-KR" altLang="en-US"/>
           </a:p>
@@ -473,7 +473,7 @@
           <a:p>
             <a:fld id="{3916EF0B-21FF-479F-8051-9F9DC1DC802A}" type="datetimeFigureOut">
               <a:rPr lang="ko-KR" altLang="en-US" smtClean="0"/>
-              <a:t>2019-10-24</a:t>
+              <a:t>2019-10-26</a:t>
             </a:fld>
             <a:endParaRPr lang="ko-KR" altLang="en-US"/>
           </a:p>
@@ -683,7 +683,7 @@
           <a:p>
             <a:fld id="{3916EF0B-21FF-479F-8051-9F9DC1DC802A}" type="datetimeFigureOut">
               <a:rPr lang="ko-KR" altLang="en-US" smtClean="0"/>
-              <a:t>2019-10-24</a:t>
+              <a:t>2019-10-26</a:t>
             </a:fld>
             <a:endParaRPr lang="ko-KR" altLang="en-US"/>
           </a:p>
@@ -883,7 +883,7 @@
           <a:p>
             <a:fld id="{3916EF0B-21FF-479F-8051-9F9DC1DC802A}" type="datetimeFigureOut">
               <a:rPr lang="ko-KR" altLang="en-US" smtClean="0"/>
-              <a:t>2019-10-24</a:t>
+              <a:t>2019-10-26</a:t>
             </a:fld>
             <a:endParaRPr lang="ko-KR" altLang="en-US"/>
           </a:p>
@@ -1159,7 +1159,7 @@
           <a:p>
             <a:fld id="{3916EF0B-21FF-479F-8051-9F9DC1DC802A}" type="datetimeFigureOut">
               <a:rPr lang="ko-KR" altLang="en-US" smtClean="0"/>
-              <a:t>2019-10-24</a:t>
+              <a:t>2019-10-26</a:t>
             </a:fld>
             <a:endParaRPr lang="ko-KR" altLang="en-US"/>
           </a:p>
@@ -1427,7 +1427,7 @@
           <a:p>
             <a:fld id="{3916EF0B-21FF-479F-8051-9F9DC1DC802A}" type="datetimeFigureOut">
               <a:rPr lang="ko-KR" altLang="en-US" smtClean="0"/>
-              <a:t>2019-10-24</a:t>
+              <a:t>2019-10-26</a:t>
             </a:fld>
             <a:endParaRPr lang="ko-KR" altLang="en-US"/>
           </a:p>
@@ -1842,7 +1842,7 @@
           <a:p>
             <a:fld id="{3916EF0B-21FF-479F-8051-9F9DC1DC802A}" type="datetimeFigureOut">
               <a:rPr lang="ko-KR" altLang="en-US" smtClean="0"/>
-              <a:t>2019-10-24</a:t>
+              <a:t>2019-10-26</a:t>
             </a:fld>
             <a:endParaRPr lang="ko-KR" altLang="en-US"/>
           </a:p>
@@ -1984,7 +1984,7 @@
           <a:p>
             <a:fld id="{3916EF0B-21FF-479F-8051-9F9DC1DC802A}" type="datetimeFigureOut">
               <a:rPr lang="ko-KR" altLang="en-US" smtClean="0"/>
-              <a:t>2019-10-24</a:t>
+              <a:t>2019-10-26</a:t>
             </a:fld>
             <a:endParaRPr lang="ko-KR" altLang="en-US"/>
           </a:p>
@@ -2097,7 +2097,7 @@
           <a:p>
             <a:fld id="{3916EF0B-21FF-479F-8051-9F9DC1DC802A}" type="datetimeFigureOut">
               <a:rPr lang="ko-KR" altLang="en-US" smtClean="0"/>
-              <a:t>2019-10-24</a:t>
+              <a:t>2019-10-26</a:t>
             </a:fld>
             <a:endParaRPr lang="ko-KR" altLang="en-US"/>
           </a:p>
@@ -2410,7 +2410,7 @@
           <a:p>
             <a:fld id="{3916EF0B-21FF-479F-8051-9F9DC1DC802A}" type="datetimeFigureOut">
               <a:rPr lang="ko-KR" altLang="en-US" smtClean="0"/>
-              <a:t>2019-10-24</a:t>
+              <a:t>2019-10-26</a:t>
             </a:fld>
             <a:endParaRPr lang="ko-KR" altLang="en-US"/>
           </a:p>
@@ -2699,7 +2699,7 @@
           <a:p>
             <a:fld id="{3916EF0B-21FF-479F-8051-9F9DC1DC802A}" type="datetimeFigureOut">
               <a:rPr lang="ko-KR" altLang="en-US" smtClean="0"/>
-              <a:t>2019-10-24</a:t>
+              <a:t>2019-10-26</a:t>
             </a:fld>
             <a:endParaRPr lang="ko-KR" altLang="en-US"/>
           </a:p>
@@ -2942,7 +2942,7 @@
           <a:p>
             <a:fld id="{3916EF0B-21FF-479F-8051-9F9DC1DC802A}" type="datetimeFigureOut">
               <a:rPr lang="ko-KR" altLang="en-US" smtClean="0"/>
-              <a:t>2019-10-24</a:t>
+              <a:t>2019-10-26</a:t>
             </a:fld>
             <a:endParaRPr lang="ko-KR" altLang="en-US"/>
           </a:p>
@@ -3456,122 +3456,6 @@
           <p:cNvPr id="2" name="Title 1">
             <a:extLst>
               <a:ext uri="{FF2B5EF4-FFF2-40B4-BE49-F238E27FC236}">
-                <a16:creationId xmlns:a16="http://schemas.microsoft.com/office/drawing/2014/main" xmlns="" id="{893E36EE-3C3B-4D62-A2CD-DD1B450BD26F}"/>
-              </a:ext>
-            </a:extLst>
-          </p:cNvPr>
-          <p:cNvSpPr>
-            <a:spLocks noGrp="1"/>
-          </p:cNvSpPr>
-          <p:nvPr>
-            <p:ph type="title"/>
-          </p:nvPr>
-        </p:nvSpPr>
-        <p:spPr/>
-        <p:txBody>
-          <a:bodyPr/>
-          <a:lstStyle/>
-          <a:p>
-            <a:r>
-              <a:rPr lang="en-US" altLang="ko-KR" dirty="0"/>
-              <a:t>Markdown Structure</a:t>
-            </a:r>
-            <a:endParaRPr lang="ko-KR" altLang="en-US" dirty="0"/>
-          </a:p>
-        </p:txBody>
-      </p:sp>
-      <p:sp>
-        <p:nvSpPr>
-          <p:cNvPr id="3" name="Content Placeholder 2">
-            <a:extLst>
-              <a:ext uri="{FF2B5EF4-FFF2-40B4-BE49-F238E27FC236}">
-                <a16:creationId xmlns:a16="http://schemas.microsoft.com/office/drawing/2014/main" xmlns="" id="{57A83FD4-7A95-4CC3-B8B0-75DA930350AA}"/>
-              </a:ext>
-            </a:extLst>
-          </p:cNvPr>
-          <p:cNvSpPr>
-            <a:spLocks noGrp="1"/>
-          </p:cNvSpPr>
-          <p:nvPr>
-            <p:ph idx="1"/>
-          </p:nvPr>
-        </p:nvSpPr>
-        <p:spPr/>
-        <p:txBody>
-          <a:bodyPr>
-            <a:normAutofit/>
-          </a:bodyPr>
-          <a:lstStyle/>
-          <a:p>
-            <a:r>
-              <a:rPr lang="en-US" altLang="ko-KR" dirty="0"/>
-              <a:t>Front-matter / Content</a:t>
-            </a:r>
-          </a:p>
-          <a:p>
-            <a:endParaRPr lang="en-US" altLang="ko-KR" dirty="0"/>
-          </a:p>
-          <a:p>
-            <a:r>
-              <a:rPr lang="en-US" altLang="ko-KR" dirty="0"/>
-              <a:t>SSG deals with front-matter, focus on content</a:t>
-            </a:r>
-          </a:p>
-          <a:p>
-            <a:endParaRPr lang="en-US" altLang="ko-KR" dirty="0"/>
-          </a:p>
-          <a:p>
-            <a:r>
-              <a:rPr lang="en-US" altLang="ko-KR" dirty="0"/>
-              <a:t>#, =, -, *, _, &gt;, +, ! are already used</a:t>
-            </a:r>
-          </a:p>
-          <a:p>
-            <a:endParaRPr lang="en-US" altLang="ko-KR" dirty="0"/>
-          </a:p>
-          <a:p>
-            <a:r>
-              <a:rPr lang="en-US" altLang="ko-KR" dirty="0"/>
-              <a:t>Need to use some other mark to make commands($ or %)</a:t>
-            </a:r>
-          </a:p>
-        </p:txBody>
-      </p:sp>
-    </p:spTree>
-    <p:extLst>
-      <p:ext uri="{BB962C8B-B14F-4D97-AF65-F5344CB8AC3E}">
-        <p14:creationId xmlns:p14="http://schemas.microsoft.com/office/powerpoint/2010/main" val="1020832055"/>
-      </p:ext>
-    </p:extLst>
-  </p:cSld>
-  <p:clrMapOvr>
-    <a:masterClrMapping/>
-  </p:clrMapOvr>
-</p:sld>
-</file>
-
-<file path=ppt/slides/slide11.xml><?xml version="1.0" encoding="utf-8"?>
-<p:sld xmlns:a="http://schemas.openxmlformats.org/drawingml/2006/main" xmlns:r="http://schemas.openxmlformats.org/officeDocument/2006/relationships" xmlns:p="http://schemas.openxmlformats.org/presentationml/2006/main">
-  <p:cSld>
-    <p:spTree>
-      <p:nvGrpSpPr>
-        <p:cNvPr id="1" name=""/>
-        <p:cNvGrpSpPr/>
-        <p:nvPr/>
-      </p:nvGrpSpPr>
-      <p:grpSpPr>
-        <a:xfrm>
-          <a:off x="0" y="0"/>
-          <a:ext cx="0" cy="0"/>
-          <a:chOff x="0" y="0"/>
-          <a:chExt cx="0" cy="0"/>
-        </a:xfrm>
-      </p:grpSpPr>
-      <p:sp>
-        <p:nvSpPr>
-          <p:cNvPr id="2" name="Title 1">
-            <a:extLst>
-              <a:ext uri="{FF2B5EF4-FFF2-40B4-BE49-F238E27FC236}">
                 <a16:creationId xmlns:a16="http://schemas.microsoft.com/office/drawing/2014/main" xmlns="" id="{4296AA8A-6959-4908-8051-65608155529B}"/>
               </a:ext>
             </a:extLst>
@@ -3641,6 +3525,136 @@
 </p:sld>
 </file>
 
+<file path=ppt/slides/slide11.xml><?xml version="1.0" encoding="utf-8"?>
+<p:sld xmlns:a="http://schemas.openxmlformats.org/drawingml/2006/main" xmlns:r="http://schemas.openxmlformats.org/officeDocument/2006/relationships" xmlns:p="http://schemas.openxmlformats.org/presentationml/2006/main">
+  <p:cSld>
+    <p:spTree>
+      <p:nvGrpSpPr>
+        <p:cNvPr id="1" name=""/>
+        <p:cNvGrpSpPr/>
+        <p:nvPr/>
+      </p:nvGrpSpPr>
+      <p:grpSpPr>
+        <a:xfrm>
+          <a:off x="0" y="0"/>
+          <a:ext cx="0" cy="0"/>
+          <a:chOff x="0" y="0"/>
+          <a:chExt cx="0" cy="0"/>
+        </a:xfrm>
+      </p:grpSpPr>
+      <p:sp>
+        <p:nvSpPr>
+          <p:cNvPr id="2" name="제목 1"/>
+          <p:cNvSpPr>
+            <a:spLocks noGrp="1"/>
+          </p:cNvSpPr>
+          <p:nvPr>
+            <p:ph type="title"/>
+          </p:nvPr>
+        </p:nvSpPr>
+        <p:spPr/>
+        <p:txBody>
+          <a:bodyPr/>
+          <a:lstStyle/>
+          <a:p>
+            <a:r>
+              <a:rPr lang="en-US" altLang="ko-KR" dirty="0" smtClean="0"/>
+              <a:t>Structure</a:t>
+            </a:r>
+            <a:endParaRPr lang="ko-KR" altLang="en-US" dirty="0"/>
+          </a:p>
+        </p:txBody>
+      </p:sp>
+      <p:sp>
+        <p:nvSpPr>
+          <p:cNvPr id="3" name="내용 개체 틀 2"/>
+          <p:cNvSpPr>
+            <a:spLocks noGrp="1"/>
+          </p:cNvSpPr>
+          <p:nvPr>
+            <p:ph idx="1"/>
+          </p:nvPr>
+        </p:nvSpPr>
+        <p:spPr/>
+        <p:txBody>
+          <a:bodyPr/>
+          <a:lstStyle/>
+          <a:p>
+            <a:r>
+              <a:rPr lang="en-US" altLang="ko-KR" dirty="0" smtClean="0"/>
+              <a:t>Front-matter is processed depending on which SSG is used</a:t>
+            </a:r>
+          </a:p>
+          <a:p>
+            <a:pPr lvl="1"/>
+            <a:r>
+              <a:rPr lang="en-US" altLang="ko-KR" dirty="0" smtClean="0"/>
+              <a:t>Zola(primary), Hugo, </a:t>
+            </a:r>
+            <a:r>
+              <a:rPr lang="en-US" altLang="ko-KR" dirty="0" err="1" smtClean="0"/>
+              <a:t>etc</a:t>
+            </a:r>
+            <a:r>
+              <a:rPr lang="en-US" altLang="ko-KR" dirty="0" smtClean="0"/>
+              <a:t>…</a:t>
+            </a:r>
+          </a:p>
+          <a:p>
+            <a:endParaRPr lang="en-US" altLang="ko-KR" dirty="0"/>
+          </a:p>
+          <a:p>
+            <a:r>
+              <a:rPr lang="en-US" altLang="ko-KR" dirty="0" smtClean="0"/>
+              <a:t>Content is processed with certain command</a:t>
+            </a:r>
+          </a:p>
+          <a:p>
+            <a:pPr lvl="1"/>
+            <a:r>
+              <a:rPr lang="en-US" altLang="ko-KR" dirty="0"/>
+              <a:t>c</a:t>
+            </a:r>
+            <a:r>
+              <a:rPr lang="en-US" altLang="ko-KR" dirty="0" smtClean="0"/>
+              <a:t>ode, execute result, </a:t>
+            </a:r>
+            <a:r>
+              <a:rPr lang="en-US" altLang="ko-KR" dirty="0" err="1" smtClean="0"/>
+              <a:t>youtube</a:t>
+            </a:r>
+            <a:r>
+              <a:rPr lang="en-US" altLang="ko-KR" dirty="0" smtClean="0"/>
+              <a:t>, </a:t>
+            </a:r>
+            <a:r>
+              <a:rPr lang="en-US" altLang="ko-KR" dirty="0" err="1" smtClean="0"/>
+              <a:t>etc</a:t>
+            </a:r>
+            <a:r>
+              <a:rPr lang="en-US" altLang="ko-KR" smtClean="0"/>
+              <a:t>…</a:t>
+            </a:r>
+            <a:endParaRPr lang="en-US" altLang="ko-KR" dirty="0"/>
+          </a:p>
+          <a:p>
+            <a:endParaRPr lang="ko-KR" altLang="en-US" dirty="0"/>
+          </a:p>
+        </p:txBody>
+      </p:sp>
+    </p:spTree>
+    <p:extLst>
+      <p:ext uri="{BB962C8B-B14F-4D97-AF65-F5344CB8AC3E}">
+        <p14:creationId xmlns:p14="http://schemas.microsoft.com/office/powerpoint/2010/main" val="2365475616"/>
+      </p:ext>
+    </p:extLst>
+  </p:cSld>
+  <p:clrMapOvr>
+    <a:masterClrMapping/>
+  </p:clrMapOvr>
+</p:sld>
+</file>
+
 <file path=ppt/slides/slide12.xml><?xml version="1.0" encoding="utf-8"?>
 <p:sld xmlns:a="http://schemas.openxmlformats.org/drawingml/2006/main" xmlns:r="http://schemas.openxmlformats.org/officeDocument/2006/relationships" xmlns:p="http://schemas.openxmlformats.org/presentationml/2006/main">
   <p:cSld>
@@ -3658,229 +3672,81 @@
           <a:chExt cx="0" cy="0"/>
         </a:xfrm>
       </p:grpSpPr>
-      <p:sp>
-        <p:nvSpPr>
-          <p:cNvPr id="2" name="제목 1"/>
-          <p:cNvSpPr>
-            <a:spLocks noGrp="1"/>
-          </p:cNvSpPr>
-          <p:nvPr>
-            <p:ph type="title"/>
-          </p:nvPr>
-        </p:nvSpPr>
-        <p:spPr/>
-        <p:txBody>
-          <a:bodyPr/>
-          <a:lstStyle/>
-          <a:p>
-            <a:r>
-              <a:rPr lang="en-US" altLang="ko-KR" dirty="0" smtClean="0"/>
-              <a:t>Structure</a:t>
-            </a:r>
-            <a:endParaRPr lang="ko-KR" altLang="en-US" dirty="0"/>
-          </a:p>
-        </p:txBody>
-      </p:sp>
-      <p:sp>
-        <p:nvSpPr>
-          <p:cNvPr id="4" name="직사각형 3"/>
-          <p:cNvSpPr/>
+      <p:pic>
+        <p:nvPicPr>
+          <p:cNvPr id="1026" name="Picture 2" descr="C:\Users\USER\Downloads\Untitled Diagram.png"/>
+          <p:cNvPicPr>
+            <a:picLocks noChangeAspect="1" noChangeArrowheads="1"/>
+          </p:cNvPicPr>
           <p:nvPr/>
-        </p:nvSpPr>
-        <p:spPr>
+        </p:nvPicPr>
+        <p:blipFill>
+          <a:blip r:embed="rId2">
+            <a:extLst>
+              <a:ext uri="{28A0092B-C50C-407E-A947-70E740481C1C}">
+                <a14:useLocalDpi xmlns:a14="http://schemas.microsoft.com/office/drawing/2010/main" val="0"/>
+              </a:ext>
+            </a:extLst>
+          </a:blip>
+          <a:srcRect/>
+          <a:stretch>
+            <a:fillRect/>
+          </a:stretch>
+        </p:blipFill>
+        <p:spPr bwMode="auto">
           <a:xfrm>
-            <a:off x="764771" y="2847114"/>
-            <a:ext cx="2676698" cy="606829"/>
+            <a:off x="1335280" y="1110517"/>
+            <a:ext cx="9415299" cy="4618567"/>
           </a:xfrm>
           <a:prstGeom prst="rect">
             <a:avLst/>
           </a:prstGeom>
           <a:noFill/>
-          <a:ln>
-            <a:solidFill>
-              <a:schemeClr val="tx1"/>
-            </a:solidFill>
-          </a:ln>
+          <a:extLst>
+            <a:ext uri="{909E8E84-426E-40DD-AFC4-6F175D3DCCD1}">
+              <a14:hiddenFill xmlns:a14="http://schemas.microsoft.com/office/drawing/2010/main">
+                <a:solidFill>
+                  <a:srgbClr val="FFFFFF"/>
+                </a:solidFill>
+              </a14:hiddenFill>
+            </a:ext>
+          </a:extLst>
         </p:spPr>
-        <p:style>
-          <a:lnRef idx="2">
-            <a:schemeClr val="accent1">
-              <a:shade val="50000"/>
-            </a:schemeClr>
-          </a:lnRef>
-          <a:fillRef idx="1">
-            <a:schemeClr val="accent1"/>
-          </a:fillRef>
-          <a:effectRef idx="0">
-            <a:schemeClr val="accent1"/>
-          </a:effectRef>
-          <a:fontRef idx="minor">
-            <a:schemeClr val="lt1"/>
-          </a:fontRef>
-        </p:style>
-        <p:txBody>
-          <a:bodyPr rtlCol="0" anchor="ctr"/>
-          <a:lstStyle/>
-          <a:p>
-            <a:pPr algn="ctr"/>
-            <a:r>
-              <a:rPr lang="en-US" altLang="ko-KR" dirty="0" smtClean="0">
-                <a:solidFill>
-                  <a:schemeClr val="tx1"/>
-                </a:solidFill>
-              </a:rPr>
-              <a:t>&lt;&lt;Interface&gt;&gt;</a:t>
-            </a:r>
-          </a:p>
-          <a:p>
-            <a:pPr algn="ctr"/>
-            <a:r>
-              <a:rPr lang="en-US" altLang="ko-KR" dirty="0" smtClean="0">
-                <a:solidFill>
-                  <a:schemeClr val="tx1"/>
-                </a:solidFill>
-              </a:rPr>
-              <a:t>Command</a:t>
-            </a:r>
-            <a:endParaRPr lang="ko-KR" altLang="en-US" dirty="0">
-              <a:solidFill>
-                <a:schemeClr val="tx1"/>
-              </a:solidFill>
-            </a:endParaRPr>
-          </a:p>
-        </p:txBody>
-      </p:sp>
-      <p:sp>
-        <p:nvSpPr>
-          <p:cNvPr id="6" name="직사각형 5"/>
-          <p:cNvSpPr/>
+      </p:pic>
+      <p:sp>
+        <p:nvSpPr>
+          <p:cNvPr id="28" name="TextBox 27"/>
+          <p:cNvSpPr txBox="1"/>
           <p:nvPr/>
         </p:nvSpPr>
         <p:spPr>
           <a:xfrm>
-            <a:off x="764771" y="3453944"/>
-            <a:ext cx="2676698" cy="606829"/>
+            <a:off x="4937761" y="556951"/>
+            <a:ext cx="1729047" cy="369332"/>
           </a:xfrm>
           <a:prstGeom prst="rect">
             <a:avLst/>
           </a:prstGeom>
           <a:noFill/>
-          <a:ln>
-            <a:solidFill>
-              <a:schemeClr val="tx1"/>
-            </a:solidFill>
-          </a:ln>
         </p:spPr>
-        <p:style>
-          <a:lnRef idx="2">
-            <a:schemeClr val="accent1">
-              <a:shade val="50000"/>
-            </a:schemeClr>
-          </a:lnRef>
-          <a:fillRef idx="1">
-            <a:schemeClr val="accent1"/>
-          </a:fillRef>
-          <a:effectRef idx="0">
-            <a:schemeClr val="accent1"/>
-          </a:effectRef>
-          <a:fontRef idx="minor">
-            <a:schemeClr val="lt1"/>
-          </a:fontRef>
-        </p:style>
-        <p:txBody>
-          <a:bodyPr rtlCol="0" anchor="ctr"/>
-          <a:lstStyle/>
-          <a:p>
-            <a:pPr algn="ctr"/>
-            <a:endParaRPr lang="ko-KR" altLang="en-US" dirty="0">
-              <a:solidFill>
-                <a:schemeClr val="tx1"/>
-              </a:solidFill>
-            </a:endParaRPr>
-          </a:p>
-        </p:txBody>
-      </p:sp>
-      <p:sp>
-        <p:nvSpPr>
-          <p:cNvPr id="8" name="직사각형 7"/>
-          <p:cNvSpPr/>
-          <p:nvPr/>
-        </p:nvSpPr>
-        <p:spPr>
-          <a:xfrm>
-            <a:off x="764771" y="4060773"/>
-            <a:ext cx="2676698" cy="727358"/>
-          </a:xfrm>
-          <a:prstGeom prst="rect">
-            <a:avLst/>
-          </a:prstGeom>
-          <a:noFill/>
-          <a:ln>
-            <a:solidFill>
-              <a:schemeClr val="tx1"/>
-            </a:solidFill>
-          </a:ln>
-        </p:spPr>
-        <p:style>
-          <a:lnRef idx="2">
-            <a:schemeClr val="accent1">
-              <a:shade val="50000"/>
-            </a:schemeClr>
-          </a:lnRef>
-          <a:fillRef idx="1">
-            <a:schemeClr val="accent1"/>
-          </a:fillRef>
-          <a:effectRef idx="0">
-            <a:schemeClr val="accent1"/>
-          </a:effectRef>
-          <a:fontRef idx="minor">
-            <a:schemeClr val="lt1"/>
-          </a:fontRef>
-        </p:style>
-        <p:txBody>
-          <a:bodyPr rtlCol="0" anchor="ctr"/>
-          <a:lstStyle/>
-          <a:p>
-            <a:pPr algn="ctr"/>
-            <a:r>
-              <a:rPr lang="en-US" altLang="ko-KR" dirty="0" smtClean="0">
-                <a:solidFill>
-                  <a:schemeClr val="tx1"/>
-                </a:solidFill>
-              </a:rPr>
-              <a:t>execute()</a:t>
-            </a:r>
-          </a:p>
-          <a:p>
-            <a:pPr algn="ctr"/>
-            <a:r>
-              <a:rPr lang="en-US" altLang="ko-KR" dirty="0" err="1" smtClean="0">
-                <a:solidFill>
-                  <a:schemeClr val="tx1"/>
-                </a:solidFill>
-              </a:rPr>
-              <a:t>check_args</a:t>
-            </a:r>
-            <a:r>
-              <a:rPr lang="en-US" altLang="ko-KR" dirty="0" smtClean="0">
-                <a:solidFill>
-                  <a:schemeClr val="tx1"/>
-                </a:solidFill>
-              </a:rPr>
-              <a:t>()</a:t>
-            </a:r>
-            <a:endParaRPr lang="ko-KR" altLang="en-US" dirty="0">
-              <a:solidFill>
-                <a:schemeClr val="tx1"/>
-              </a:solidFill>
-            </a:endParaRPr>
+        <p:txBody>
+          <a:bodyPr wrap="square" rtlCol="0">
+            <a:spAutoFit/>
+          </a:bodyPr>
+          <a:lstStyle/>
+          <a:p>
+            <a:r>
+              <a:rPr lang="en-US" altLang="ko-KR" dirty="0" smtClean="0"/>
+              <a:t>non-normative</a:t>
+            </a:r>
+            <a:endParaRPr lang="ko-KR" altLang="en-US" dirty="0"/>
           </a:p>
         </p:txBody>
       </p:sp>
     </p:spTree>
     <p:extLst>
       <p:ext uri="{BB962C8B-B14F-4D97-AF65-F5344CB8AC3E}">
-        <p14:creationId xmlns:p14="http://schemas.microsoft.com/office/powerpoint/2010/main" val="429130084"/>
+        <p14:creationId xmlns:p14="http://schemas.microsoft.com/office/powerpoint/2010/main" val="1135613917"/>
       </p:ext>
     </p:extLst>
   </p:cSld>
@@ -5826,11 +5692,11 @@
           <a:p>
             <a:r>
               <a:rPr lang="en-US" altLang="ko-KR" dirty="0"/>
-              <a:t>Input : ‘</a:t>
-            </a:r>
-            <a:r>
-              <a:rPr lang="en-US" altLang="ko-KR" dirty="0" err="1"/>
-              <a:t>sudo</a:t>
+              <a:t>Input : </a:t>
+            </a:r>
+            <a:r>
+              <a:rPr lang="en-US" altLang="ko-KR" dirty="0" smtClean="0"/>
+              <a:t>‘pseudo</a:t>
             </a:r>
             <a:r>
               <a:rPr lang="en-US" altLang="ko-KR" dirty="0"/>
@@ -5852,7 +5718,15 @@
           <a:p>
             <a:r>
               <a:rPr lang="en-US" altLang="ko-KR" dirty="0"/>
-              <a:t>Get external code snippet file from directory and display the content(use built-in syntax highlighting) with executed result</a:t>
+              <a:t>Get external code snippet file from directory and display the content(use built-in syntax </a:t>
+            </a:r>
+            <a:r>
+              <a:rPr lang="en-US" altLang="ko-KR" dirty="0" smtClean="0"/>
+              <a:t>highlighting?) </a:t>
+            </a:r>
+            <a:r>
+              <a:rPr lang="en-US" altLang="ko-KR" dirty="0"/>
+              <a:t>with executed result</a:t>
             </a:r>
           </a:p>
           <a:p>
@@ -5901,7 +5775,7 @@
           <p:cNvPr id="2" name="Title 1">
             <a:extLst>
               <a:ext uri="{FF2B5EF4-FFF2-40B4-BE49-F238E27FC236}">
-                <a16:creationId xmlns:a16="http://schemas.microsoft.com/office/drawing/2014/main" xmlns="" id="{1266B335-A155-4FF1-983C-1B8CF3E6A768}"/>
+                <a16:creationId xmlns:a16="http://schemas.microsoft.com/office/drawing/2014/main" xmlns="" id="{893E36EE-3C3B-4D62-A2CD-DD1B450BD26F}"/>
               </a:ext>
             </a:extLst>
           </p:cNvPr>
@@ -5919,7 +5793,7 @@
           <a:p>
             <a:r>
               <a:rPr lang="en-US" altLang="ko-KR" dirty="0"/>
-              <a:t>Features to implement “later”</a:t>
+              <a:t>Markdown Structure</a:t>
             </a:r>
             <a:endParaRPr lang="ko-KR" altLang="en-US" dirty="0"/>
           </a:p>
@@ -5930,7 +5804,7 @@
           <p:cNvPr id="3" name="Content Placeholder 2">
             <a:extLst>
               <a:ext uri="{FF2B5EF4-FFF2-40B4-BE49-F238E27FC236}">
-                <a16:creationId xmlns:a16="http://schemas.microsoft.com/office/drawing/2014/main" xmlns="" id="{5FA37FAE-6AED-4FDC-87B5-8D7FDD6F0F80}"/>
+                <a16:creationId xmlns:a16="http://schemas.microsoft.com/office/drawing/2014/main" xmlns="" id="{57A83FD4-7A95-4CC3-B8B0-75DA930350AA}"/>
               </a:ext>
             </a:extLst>
           </p:cNvPr>
@@ -5943,21 +5817,49 @@
         </p:nvSpPr>
         <p:spPr/>
         <p:txBody>
-          <a:bodyPr/>
+          <a:bodyPr>
+            <a:normAutofit/>
+          </a:bodyPr>
           <a:lstStyle/>
           <a:p>
             <a:r>
               <a:rPr lang="en-US" altLang="ko-KR" dirty="0"/>
-              <a:t>Generate front-matter depended on SSG</a:t>
-            </a:r>
-            <a:endParaRPr lang="ko-KR" altLang="en-US" dirty="0"/>
+              <a:t>Front-matter / Content</a:t>
+            </a:r>
+          </a:p>
+          <a:p>
+            <a:endParaRPr lang="en-US" altLang="ko-KR" dirty="0"/>
+          </a:p>
+          <a:p>
+            <a:r>
+              <a:rPr lang="en-US" altLang="ko-KR" dirty="0"/>
+              <a:t>SSG deals with front-matter, focus on content</a:t>
+            </a:r>
+          </a:p>
+          <a:p>
+            <a:endParaRPr lang="en-US" altLang="ko-KR" dirty="0"/>
+          </a:p>
+          <a:p>
+            <a:r>
+              <a:rPr lang="en-US" altLang="ko-KR" dirty="0"/>
+              <a:t>#, =, -, *, _, &gt;, +, ! are already used</a:t>
+            </a:r>
+          </a:p>
+          <a:p>
+            <a:endParaRPr lang="en-US" altLang="ko-KR" dirty="0"/>
+          </a:p>
+          <a:p>
+            <a:r>
+              <a:rPr lang="en-US" altLang="ko-KR" dirty="0"/>
+              <a:t>Need to use some other mark to make commands($ or %)</a:t>
+            </a:r>
           </a:p>
         </p:txBody>
       </p:sp>
     </p:spTree>
     <p:extLst>
       <p:ext uri="{BB962C8B-B14F-4D97-AF65-F5344CB8AC3E}">
-        <p14:creationId xmlns:p14="http://schemas.microsoft.com/office/powerpoint/2010/main" val="1298351479"/>
+        <p14:creationId xmlns:p14="http://schemas.microsoft.com/office/powerpoint/2010/main" val="1020832055"/>
       </p:ext>
     </p:extLst>
   </p:cSld>

</xml_diff>